<commit_message>
updated Lab 1 slides for tinkercad
</commit_message>
<xml_diff>
--- a/Lab 1/CS 341 Lab introduction.pptx
+++ b/Lab 1/CS 341 Lab introduction.pptx
@@ -7,13 +7,15 @@
   <p:sldIdLst>
     <p:sldId id="256" r:id="rId2"/>
     <p:sldId id="260" r:id="rId3"/>
-    <p:sldId id="265" r:id="rId4"/>
-    <p:sldId id="258" r:id="rId5"/>
-    <p:sldId id="263" r:id="rId6"/>
-    <p:sldId id="262" r:id="rId7"/>
-    <p:sldId id="264" r:id="rId8"/>
-    <p:sldId id="257" r:id="rId9"/>
+    <p:sldId id="257" r:id="rId4"/>
+    <p:sldId id="265" r:id="rId5"/>
+    <p:sldId id="258" r:id="rId6"/>
+    <p:sldId id="263" r:id="rId7"/>
+    <p:sldId id="262" r:id="rId8"/>
+    <p:sldId id="264" r:id="rId9"/>
     <p:sldId id="259" r:id="rId10"/>
+    <p:sldId id="266" r:id="rId11"/>
+    <p:sldId id="267" r:id="rId12"/>
   </p:sldIdLst>
   <p:sldSz cx="12192000" cy="6858000"/>
   <p:notesSz cx="6858000" cy="9144000"/>
@@ -346,7 +348,7 @@
           <a:p>
             <a:fld id="{48A87A34-81AB-432B-8DAE-1953F412C126}" type="datetimeFigureOut">
               <a:rPr lang="en-US" smtClean="0"/>
-              <a:t>9/13/2020</a:t>
+              <a:t>9/20/2020</a:t>
             </a:fld>
             <a:endParaRPr lang="en-US" dirty="0"/>
           </a:p>
@@ -554,7 +556,7 @@
           <a:p>
             <a:fld id="{48A87A34-81AB-432B-8DAE-1953F412C126}" type="datetimeFigureOut">
               <a:rPr lang="en-US" smtClean="0"/>
-              <a:t>9/13/2020</a:t>
+              <a:t>9/20/2020</a:t>
             </a:fld>
             <a:endParaRPr lang="en-US" dirty="0"/>
           </a:p>
@@ -810,7 +812,7 @@
           <a:p>
             <a:fld id="{48A87A34-81AB-432B-8DAE-1953F412C126}" type="datetimeFigureOut">
               <a:rPr lang="en-US" smtClean="0"/>
-              <a:t>9/13/2020</a:t>
+              <a:t>9/20/2020</a:t>
             </a:fld>
             <a:endParaRPr lang="en-US" dirty="0"/>
           </a:p>
@@ -984,7 +986,7 @@
           <a:p>
             <a:fld id="{48A87A34-81AB-432B-8DAE-1953F412C126}" type="datetimeFigureOut">
               <a:rPr lang="en-US" smtClean="0"/>
-              <a:t>9/13/2020</a:t>
+              <a:t>9/20/2020</a:t>
             </a:fld>
             <a:endParaRPr lang="en-US" dirty="0"/>
           </a:p>
@@ -1327,7 +1329,7 @@
           <a:p>
             <a:fld id="{48A87A34-81AB-432B-8DAE-1953F412C126}" type="datetimeFigureOut">
               <a:rPr lang="en-US" smtClean="0"/>
-              <a:t>9/13/2020</a:t>
+              <a:t>9/20/2020</a:t>
             </a:fld>
             <a:endParaRPr lang="en-US" dirty="0"/>
           </a:p>
@@ -1602,7 +1604,7 @@
           <a:p>
             <a:fld id="{48A87A34-81AB-432B-8DAE-1953F412C126}" type="datetimeFigureOut">
               <a:rPr lang="en-US" smtClean="0"/>
-              <a:t>9/13/2020</a:t>
+              <a:t>9/20/2020</a:t>
             </a:fld>
             <a:endParaRPr lang="en-US" dirty="0"/>
           </a:p>
@@ -1981,7 +1983,7 @@
           <a:p>
             <a:fld id="{48A87A34-81AB-432B-8DAE-1953F412C126}" type="datetimeFigureOut">
               <a:rPr lang="en-US" smtClean="0"/>
-              <a:t>9/13/2020</a:t>
+              <a:t>9/20/2020</a:t>
             </a:fld>
             <a:endParaRPr lang="en-US" dirty="0"/>
           </a:p>
@@ -2099,7 +2101,7 @@
           <a:p>
             <a:fld id="{48A87A34-81AB-432B-8DAE-1953F412C126}" type="datetimeFigureOut">
               <a:rPr lang="en-US" smtClean="0"/>
-              <a:t>9/13/2020</a:t>
+              <a:t>9/20/2020</a:t>
             </a:fld>
             <a:endParaRPr lang="en-US" dirty="0"/>
           </a:p>
@@ -2270,7 +2272,7 @@
           <a:p>
             <a:fld id="{48A87A34-81AB-432B-8DAE-1953F412C126}" type="datetimeFigureOut">
               <a:rPr lang="en-US" smtClean="0"/>
-              <a:t>9/13/2020</a:t>
+              <a:t>9/20/2020</a:t>
             </a:fld>
             <a:endParaRPr lang="en-US" dirty="0"/>
           </a:p>
@@ -2624,7 +2626,7 @@
           <a:p>
             <a:fld id="{48A87A34-81AB-432B-8DAE-1953F412C126}" type="datetimeFigureOut">
               <a:rPr lang="en-US" smtClean="0"/>
-              <a:t>9/13/2020</a:t>
+              <a:t>9/20/2020</a:t>
             </a:fld>
             <a:endParaRPr lang="en-US" dirty="0"/>
           </a:p>
@@ -3006,7 +3008,7 @@
           <a:p>
             <a:fld id="{48A87A34-81AB-432B-8DAE-1953F412C126}" type="datetimeFigureOut">
               <a:rPr lang="en-US" smtClean="0"/>
-              <a:t>9/13/2020</a:t>
+              <a:t>9/20/2020</a:t>
             </a:fld>
             <a:endParaRPr lang="en-US" dirty="0"/>
           </a:p>
@@ -3294,7 +3296,7 @@
             <a:fld id="{48A87A34-81AB-432B-8DAE-1953F412C126}" type="datetimeFigureOut">
               <a:rPr lang="en-US" smtClean="0"/>
               <a:pPr/>
-              <a:t>9/13/2020</a:t>
+              <a:t>9/20/2020</a:t>
             </a:fld>
             <a:endParaRPr lang="en-US" dirty="0"/>
           </a:p>
@@ -3889,6 +3891,810 @@
 </p:sld>
 </file>
 
+<file path=ppt/slides/slide10.xml><?xml version="1.0" encoding="utf-8"?>
+<p:sld xmlns:a="http://schemas.openxmlformats.org/drawingml/2006/main" xmlns:r="http://schemas.openxmlformats.org/officeDocument/2006/relationships" xmlns:p="http://schemas.openxmlformats.org/presentationml/2006/main">
+  <p:cSld>
+    <p:bg>
+      <p:bgPr>
+        <a:solidFill>
+          <a:schemeClr val="bg1"/>
+        </a:solidFill>
+        <a:effectLst/>
+      </p:bgPr>
+    </p:bg>
+    <p:spTree>
+      <p:nvGrpSpPr>
+        <p:cNvPr id="1" name=""/>
+        <p:cNvGrpSpPr/>
+        <p:nvPr/>
+      </p:nvGrpSpPr>
+      <p:grpSpPr>
+        <a:xfrm>
+          <a:off x="0" y="0"/>
+          <a:ext cx="0" cy="0"/>
+          <a:chOff x="0" y="0"/>
+          <a:chExt cx="0" cy="0"/>
+        </a:xfrm>
+      </p:grpSpPr>
+      <p:sp>
+        <p:nvSpPr>
+          <p:cNvPr id="12" name="Rectangle 11">
+            <a:extLst>
+              <a:ext uri="{FF2B5EF4-FFF2-40B4-BE49-F238E27FC236}">
+                <a16:creationId xmlns:a16="http://schemas.microsoft.com/office/drawing/2014/main" id="{7D379150-F6B4-45C8-BE10-6B278AD400EB}"/>
+              </a:ext>
+              <a:ext uri="{C183D7F6-B498-43B3-948B-1728B52AA6E4}">
+                <adec:decorative xmlns:adec="http://schemas.microsoft.com/office/drawing/2017/decorative" val="1"/>
+              </a:ext>
+            </a:extLst>
+          </p:cNvPr>
+          <p:cNvSpPr>
+            <a:spLocks noGrp="1" noRot="1" noChangeAspect="1" noMove="1" noResize="1" noEditPoints="1" noAdjustHandles="1" noChangeArrowheads="1" noChangeShapeType="1" noTextEdit="1"/>
+          </p:cNvSpPr>
+          <p:nvPr>
+            <p:extLst>
+              <p:ext uri="{386F3935-93C4-4BCD-93E2-E3B085C9AB24}">
+                <p16:designElem xmlns:p16="http://schemas.microsoft.com/office/powerpoint/2015/main" val="1"/>
+              </p:ext>
+            </p:extLst>
+          </p:nvPr>
+        </p:nvSpPr>
+        <p:spPr>
+          <a:xfrm>
+            <a:off x="1" y="6400800"/>
+            <a:ext cx="12192000" cy="457200"/>
+          </a:xfrm>
+          <a:prstGeom prst="rect">
+            <a:avLst/>
+          </a:prstGeom>
+          <a:solidFill>
+            <a:schemeClr val="accent2"/>
+          </a:solidFill>
+          <a:ln>
+            <a:noFill/>
+          </a:ln>
+        </p:spPr>
+        <p:style>
+          <a:lnRef idx="2">
+            <a:schemeClr val="accent1">
+              <a:shade val="50000"/>
+            </a:schemeClr>
+          </a:lnRef>
+          <a:fillRef idx="1">
+            <a:schemeClr val="accent1"/>
+          </a:fillRef>
+          <a:effectRef idx="0">
+            <a:schemeClr val="accent1"/>
+          </a:effectRef>
+          <a:fontRef idx="minor">
+            <a:schemeClr val="lt1"/>
+          </a:fontRef>
+        </p:style>
+      </p:sp>
+      <p:sp>
+        <p:nvSpPr>
+          <p:cNvPr id="14" name="Rectangle 13">
+            <a:extLst>
+              <a:ext uri="{FF2B5EF4-FFF2-40B4-BE49-F238E27FC236}">
+                <a16:creationId xmlns:a16="http://schemas.microsoft.com/office/drawing/2014/main" id="{5FFCF544-A370-4A5D-A95F-CA6E0E7191E6}"/>
+              </a:ext>
+              <a:ext uri="{C183D7F6-B498-43B3-948B-1728B52AA6E4}">
+                <adec:decorative xmlns:adec="http://schemas.microsoft.com/office/drawing/2017/decorative" val="1"/>
+              </a:ext>
+            </a:extLst>
+          </p:cNvPr>
+          <p:cNvSpPr>
+            <a:spLocks noGrp="1" noRot="1" noChangeAspect="1" noMove="1" noResize="1" noEditPoints="1" noAdjustHandles="1" noChangeArrowheads="1" noChangeShapeType="1" noTextEdit="1"/>
+          </p:cNvSpPr>
+          <p:nvPr>
+            <p:extLst>
+              <p:ext uri="{386F3935-93C4-4BCD-93E2-E3B085C9AB24}">
+                <p16:designElem xmlns:p16="http://schemas.microsoft.com/office/powerpoint/2015/main" val="1"/>
+              </p:ext>
+            </p:extLst>
+          </p:nvPr>
+        </p:nvSpPr>
+        <p:spPr>
+          <a:xfrm>
+            <a:off x="0" y="6334316"/>
+            <a:ext cx="12192001" cy="65998"/>
+          </a:xfrm>
+          <a:prstGeom prst="rect">
+            <a:avLst/>
+          </a:prstGeom>
+          <a:solidFill>
+            <a:schemeClr val="accent1"/>
+          </a:solidFill>
+          <a:ln>
+            <a:noFill/>
+          </a:ln>
+        </p:spPr>
+        <p:style>
+          <a:lnRef idx="2">
+            <a:schemeClr val="accent1">
+              <a:shade val="50000"/>
+            </a:schemeClr>
+          </a:lnRef>
+          <a:fillRef idx="1">
+            <a:schemeClr val="accent1"/>
+          </a:fillRef>
+          <a:effectRef idx="0">
+            <a:schemeClr val="accent1"/>
+          </a:effectRef>
+          <a:fontRef idx="minor">
+            <a:schemeClr val="lt1"/>
+          </a:fontRef>
+        </p:style>
+      </p:sp>
+      <p:cxnSp>
+        <p:nvCxnSpPr>
+          <p:cNvPr id="16" name="Straight Connector 15">
+            <a:extLst>
+              <a:ext uri="{FF2B5EF4-FFF2-40B4-BE49-F238E27FC236}">
+                <a16:creationId xmlns:a16="http://schemas.microsoft.com/office/drawing/2014/main" id="{6EEB3B97-A638-498B-8083-54191CE71E01}"/>
+              </a:ext>
+              <a:ext uri="{C183D7F6-B498-43B3-948B-1728B52AA6E4}">
+                <adec:decorative xmlns:adec="http://schemas.microsoft.com/office/drawing/2017/decorative" val="1"/>
+              </a:ext>
+            </a:extLst>
+          </p:cNvPr>
+          <p:cNvCxnSpPr>
+            <a:cxnSpLocks noGrp="1" noRot="1" noChangeAspect="1" noMove="1" noResize="1" noEditPoints="1" noAdjustHandles="1" noChangeArrowheads="1" noChangeShapeType="1"/>
+          </p:cNvCxnSpPr>
+          <p:nvPr>
+            <p:extLst>
+              <p:ext uri="{386F3935-93C4-4BCD-93E2-E3B085C9AB24}">
+                <p16:designElem xmlns:p16="http://schemas.microsoft.com/office/powerpoint/2015/main" val="1"/>
+              </p:ext>
+            </p:extLst>
+          </p:nvPr>
+        </p:nvCxnSpPr>
+        <p:spPr>
+          <a:xfrm>
+            <a:off x="1193532" y="1737845"/>
+            <a:ext cx="9966960" cy="0"/>
+          </a:xfrm>
+          <a:prstGeom prst="line">
+            <a:avLst/>
+          </a:prstGeom>
+          <a:ln w="6350">
+            <a:solidFill>
+              <a:schemeClr val="tx1">
+                <a:lumMod val="50000"/>
+                <a:lumOff val="50000"/>
+              </a:schemeClr>
+            </a:solidFill>
+          </a:ln>
+        </p:spPr>
+        <p:style>
+          <a:lnRef idx="1">
+            <a:schemeClr val="accent1"/>
+          </a:lnRef>
+          <a:fillRef idx="0">
+            <a:schemeClr val="accent1"/>
+          </a:fillRef>
+          <a:effectRef idx="0">
+            <a:schemeClr val="accent1"/>
+          </a:effectRef>
+          <a:fontRef idx="minor">
+            <a:schemeClr val="tx1"/>
+          </a:fontRef>
+        </p:style>
+      </p:cxnSp>
+      <p:sp useBgFill="1">
+        <p:nvSpPr>
+          <p:cNvPr id="18" name="Rectangle 17">
+            <a:extLst>
+              <a:ext uri="{FF2B5EF4-FFF2-40B4-BE49-F238E27FC236}">
+                <a16:creationId xmlns:a16="http://schemas.microsoft.com/office/drawing/2014/main" id="{52ABB703-2B0E-4C3B-B4A2-F3973548E561}"/>
+              </a:ext>
+              <a:ext uri="{C183D7F6-B498-43B3-948B-1728B52AA6E4}">
+                <adec:decorative xmlns:adec="http://schemas.microsoft.com/office/drawing/2017/decorative" val="1"/>
+              </a:ext>
+            </a:extLst>
+          </p:cNvPr>
+          <p:cNvSpPr>
+            <a:spLocks noGrp="1" noRot="1" noChangeAspect="1" noMove="1" noResize="1" noEditPoints="1" noAdjustHandles="1" noChangeArrowheads="1" noChangeShapeType="1" noTextEdit="1"/>
+          </p:cNvSpPr>
+          <p:nvPr>
+            <p:extLst>
+              <p:ext uri="{386F3935-93C4-4BCD-93E2-E3B085C9AB24}">
+                <p16:designElem xmlns:p16="http://schemas.microsoft.com/office/powerpoint/2015/main" val="1"/>
+              </p:ext>
+            </p:extLst>
+          </p:nvPr>
+        </p:nvSpPr>
+        <p:spPr>
+          <a:xfrm>
+            <a:off x="0" y="0"/>
+            <a:ext cx="12192001" cy="6334316"/>
+          </a:xfrm>
+          <a:prstGeom prst="rect">
+            <a:avLst/>
+          </a:prstGeom>
+          <a:ln>
+            <a:noFill/>
+          </a:ln>
+        </p:spPr>
+        <p:style>
+          <a:lnRef idx="2">
+            <a:schemeClr val="accent1">
+              <a:shade val="50000"/>
+            </a:schemeClr>
+          </a:lnRef>
+          <a:fillRef idx="1">
+            <a:schemeClr val="accent1"/>
+          </a:fillRef>
+          <a:effectRef idx="0">
+            <a:schemeClr val="accent1"/>
+          </a:effectRef>
+          <a:fontRef idx="minor">
+            <a:schemeClr val="lt1"/>
+          </a:fontRef>
+        </p:style>
+        <p:txBody>
+          <a:bodyPr rtlCol="0" anchor="ctr"/>
+          <a:lstStyle/>
+          <a:p>
+            <a:pPr algn="ctr"/>
+            <a:endParaRPr lang="en-US"/>
+          </a:p>
+        </p:txBody>
+      </p:sp>
+      <p:sp>
+        <p:nvSpPr>
+          <p:cNvPr id="2" name="Title 1">
+            <a:extLst>
+              <a:ext uri="{FF2B5EF4-FFF2-40B4-BE49-F238E27FC236}">
+                <a16:creationId xmlns:a16="http://schemas.microsoft.com/office/drawing/2014/main" id="{A1966945-46F7-4819-9BAA-10DC70F3D7BE}"/>
+              </a:ext>
+            </a:extLst>
+          </p:cNvPr>
+          <p:cNvSpPr>
+            <a:spLocks noGrp="1"/>
+          </p:cNvSpPr>
+          <p:nvPr>
+            <p:ph type="title"/>
+          </p:nvPr>
+        </p:nvSpPr>
+        <p:spPr>
+          <a:xfrm>
+            <a:off x="6411685" y="634946"/>
+            <a:ext cx="5127171" cy="1450757"/>
+          </a:xfrm>
+        </p:spPr>
+        <p:txBody>
+          <a:bodyPr vert="horz" lIns="91440" tIns="45720" rIns="91440" bIns="45720" rtlCol="0" anchor="b">
+            <a:normAutofit fontScale="90000"/>
+          </a:bodyPr>
+          <a:lstStyle/>
+          <a:p>
+            <a:r>
+              <a:rPr lang="en-US" dirty="0"/>
+              <a:t>Background Information - Resistors</a:t>
+            </a:r>
+          </a:p>
+        </p:txBody>
+      </p:sp>
+      <p:pic>
+        <p:nvPicPr>
+          <p:cNvPr id="7" name="Content Placeholder 6">
+            <a:extLst>
+              <a:ext uri="{FF2B5EF4-FFF2-40B4-BE49-F238E27FC236}">
+                <a16:creationId xmlns:a16="http://schemas.microsoft.com/office/drawing/2014/main" id="{97CA43D1-5231-412B-90D5-E921BCFB6C46}"/>
+              </a:ext>
+            </a:extLst>
+          </p:cNvPr>
+          <p:cNvPicPr>
+            <a:picLocks noGrp="1" noChangeAspect="1"/>
+          </p:cNvPicPr>
+          <p:nvPr>
+            <p:ph sz="half" idx="2"/>
+          </p:nvPr>
+        </p:nvPicPr>
+        <p:blipFill>
+          <a:blip r:embed="rId2"/>
+          <a:stretch>
+            <a:fillRect/>
+          </a:stretch>
+        </p:blipFill>
+        <p:spPr>
+          <a:xfrm>
+            <a:off x="1584772" y="645106"/>
+            <a:ext cx="3568467" cy="5247747"/>
+          </a:xfrm>
+          <a:prstGeom prst="rect">
+            <a:avLst/>
+          </a:prstGeom>
+        </p:spPr>
+      </p:pic>
+      <p:cxnSp>
+        <p:nvCxnSpPr>
+          <p:cNvPr id="20" name="Straight Connector 19">
+            <a:extLst>
+              <a:ext uri="{FF2B5EF4-FFF2-40B4-BE49-F238E27FC236}">
+                <a16:creationId xmlns:a16="http://schemas.microsoft.com/office/drawing/2014/main" id="{9C21570E-E159-49A6-9891-FA397B7A92D3}"/>
+              </a:ext>
+              <a:ext uri="{C183D7F6-B498-43B3-948B-1728B52AA6E4}">
+                <adec:decorative xmlns:adec="http://schemas.microsoft.com/office/drawing/2017/decorative" val="1"/>
+              </a:ext>
+            </a:extLst>
+          </p:cNvPr>
+          <p:cNvCxnSpPr>
+            <a:cxnSpLocks noGrp="1" noRot="1" noChangeAspect="1" noMove="1" noResize="1" noEditPoints="1" noAdjustHandles="1" noChangeArrowheads="1" noChangeShapeType="1"/>
+          </p:cNvCxnSpPr>
+          <p:nvPr>
+            <p:extLst>
+              <p:ext uri="{386F3935-93C4-4BCD-93E2-E3B085C9AB24}">
+                <p16:designElem xmlns:p16="http://schemas.microsoft.com/office/powerpoint/2015/main" val="1"/>
+              </p:ext>
+            </p:extLst>
+          </p:nvPr>
+        </p:nvCxnSpPr>
+        <p:spPr>
+          <a:xfrm>
+            <a:off x="6411684" y="2086188"/>
+            <a:ext cx="4748808" cy="0"/>
+          </a:xfrm>
+          <a:prstGeom prst="line">
+            <a:avLst/>
+          </a:prstGeom>
+          <a:ln w="6350">
+            <a:solidFill>
+              <a:schemeClr val="tx1">
+                <a:lumMod val="50000"/>
+                <a:lumOff val="50000"/>
+                <a:alpha val="90000"/>
+              </a:schemeClr>
+            </a:solidFill>
+          </a:ln>
+        </p:spPr>
+        <p:style>
+          <a:lnRef idx="1">
+            <a:schemeClr val="accent1"/>
+          </a:lnRef>
+          <a:fillRef idx="0">
+            <a:schemeClr val="accent1"/>
+          </a:fillRef>
+          <a:effectRef idx="0">
+            <a:schemeClr val="accent1"/>
+          </a:effectRef>
+          <a:fontRef idx="minor">
+            <a:schemeClr val="tx1"/>
+          </a:fontRef>
+        </p:style>
+      </p:cxnSp>
+      <p:sp>
+        <p:nvSpPr>
+          <p:cNvPr id="3" name="Content Placeholder 2">
+            <a:extLst>
+              <a:ext uri="{FF2B5EF4-FFF2-40B4-BE49-F238E27FC236}">
+                <a16:creationId xmlns:a16="http://schemas.microsoft.com/office/drawing/2014/main" id="{1A29CAEF-11FA-41AA-9D72-16A9967E06F5}"/>
+              </a:ext>
+            </a:extLst>
+          </p:cNvPr>
+          <p:cNvSpPr>
+            <a:spLocks noGrp="1"/>
+          </p:cNvSpPr>
+          <p:nvPr>
+            <p:ph sz="half" idx="1"/>
+          </p:nvPr>
+        </p:nvSpPr>
+        <p:spPr>
+          <a:xfrm>
+            <a:off x="6411684" y="2198914"/>
+            <a:ext cx="5127172" cy="3670180"/>
+          </a:xfrm>
+        </p:spPr>
+        <p:txBody>
+          <a:bodyPr vert="horz" lIns="0" tIns="45720" rIns="0" bIns="45720" rtlCol="0">
+            <a:normAutofit/>
+          </a:bodyPr>
+          <a:lstStyle/>
+          <a:p>
+            <a:pPr>
+              <a:buFont typeface="Wingdings" panose="05000000000000000000" pitchFamily="2" charset="2"/>
+              <a:buChar char="§"/>
+            </a:pPr>
+            <a:r>
+              <a:rPr lang="en-US" dirty="0"/>
+              <a:t> Resistor</a:t>
+            </a:r>
+          </a:p>
+          <a:p>
+            <a:pPr>
+              <a:buFont typeface="Wingdings" panose="05000000000000000000" pitchFamily="2" charset="2"/>
+              <a:buChar char="§"/>
+            </a:pPr>
+            <a:r>
+              <a:rPr lang="en-US" dirty="0"/>
+              <a:t> reduces the amount of electricity flowing</a:t>
+            </a:r>
+          </a:p>
+          <a:p>
+            <a:pPr>
+              <a:buFont typeface="Wingdings" panose="05000000000000000000" pitchFamily="2" charset="2"/>
+              <a:buChar char="§"/>
+            </a:pPr>
+            <a:r>
+              <a:rPr lang="en-US" dirty="0"/>
+              <a:t> Resistance is measured in ohms(</a:t>
+            </a:r>
+            <a:r>
+              <a:rPr lang="el-GR" dirty="0"/>
+              <a:t>Ω</a:t>
+            </a:r>
+            <a:r>
+              <a:rPr lang="en-US" dirty="0"/>
+              <a:t>)</a:t>
+            </a:r>
+          </a:p>
+        </p:txBody>
+      </p:sp>
+      <p:sp>
+        <p:nvSpPr>
+          <p:cNvPr id="22" name="Rectangle 21">
+            <a:extLst>
+              <a:ext uri="{FF2B5EF4-FFF2-40B4-BE49-F238E27FC236}">
+                <a16:creationId xmlns:a16="http://schemas.microsoft.com/office/drawing/2014/main" id="{E95DA498-D9A2-4DA9-B9DA-B3776E08CF7E}"/>
+              </a:ext>
+              <a:ext uri="{C183D7F6-B498-43B3-948B-1728B52AA6E4}">
+                <adec:decorative xmlns:adec="http://schemas.microsoft.com/office/drawing/2017/decorative" val="1"/>
+              </a:ext>
+            </a:extLst>
+          </p:cNvPr>
+          <p:cNvSpPr>
+            <a:spLocks noGrp="1" noRot="1" noChangeAspect="1" noMove="1" noResize="1" noEditPoints="1" noAdjustHandles="1" noChangeArrowheads="1" noChangeShapeType="1" noTextEdit="1"/>
+          </p:cNvSpPr>
+          <p:nvPr>
+            <p:extLst>
+              <p:ext uri="{386F3935-93C4-4BCD-93E2-E3B085C9AB24}">
+                <p16:designElem xmlns:p16="http://schemas.microsoft.com/office/powerpoint/2015/main" val="1"/>
+              </p:ext>
+            </p:extLst>
+          </p:nvPr>
+        </p:nvSpPr>
+        <p:spPr>
+          <a:xfrm>
+            <a:off x="15" y="6334316"/>
+            <a:ext cx="12191985" cy="66484"/>
+          </a:xfrm>
+          <a:prstGeom prst="rect">
+            <a:avLst/>
+          </a:prstGeom>
+          <a:solidFill>
+            <a:schemeClr val="accent1"/>
+          </a:solidFill>
+          <a:ln>
+            <a:noFill/>
+          </a:ln>
+        </p:spPr>
+        <p:style>
+          <a:lnRef idx="2">
+            <a:schemeClr val="accent1">
+              <a:shade val="50000"/>
+            </a:schemeClr>
+          </a:lnRef>
+          <a:fillRef idx="1">
+            <a:schemeClr val="accent1"/>
+          </a:fillRef>
+          <a:effectRef idx="0">
+            <a:schemeClr val="accent1"/>
+          </a:effectRef>
+          <a:fontRef idx="minor">
+            <a:schemeClr val="lt1"/>
+          </a:fontRef>
+        </p:style>
+      </p:sp>
+      <p:sp>
+        <p:nvSpPr>
+          <p:cNvPr id="24" name="Rectangle 23">
+            <a:extLst>
+              <a:ext uri="{FF2B5EF4-FFF2-40B4-BE49-F238E27FC236}">
+                <a16:creationId xmlns:a16="http://schemas.microsoft.com/office/drawing/2014/main" id="{82A73093-4B9D-420D-B17E-52293703A1D4}"/>
+              </a:ext>
+              <a:ext uri="{C183D7F6-B498-43B3-948B-1728B52AA6E4}">
+                <adec:decorative xmlns:adec="http://schemas.microsoft.com/office/drawing/2017/decorative" val="1"/>
+              </a:ext>
+            </a:extLst>
+          </p:cNvPr>
+          <p:cNvSpPr>
+            <a:spLocks noGrp="1" noRot="1" noChangeAspect="1" noMove="1" noResize="1" noEditPoints="1" noAdjustHandles="1" noChangeArrowheads="1" noChangeShapeType="1" noTextEdit="1"/>
+          </p:cNvSpPr>
+          <p:nvPr>
+            <p:extLst>
+              <p:ext uri="{386F3935-93C4-4BCD-93E2-E3B085C9AB24}">
+                <p16:designElem xmlns:p16="http://schemas.microsoft.com/office/powerpoint/2015/main" val="1"/>
+              </p:ext>
+            </p:extLst>
+          </p:nvPr>
+        </p:nvSpPr>
+        <p:spPr>
+          <a:xfrm>
+            <a:off x="1" y="6400800"/>
+            <a:ext cx="12192000" cy="457200"/>
+          </a:xfrm>
+          <a:prstGeom prst="rect">
+            <a:avLst/>
+          </a:prstGeom>
+          <a:solidFill>
+            <a:schemeClr val="accent2"/>
+          </a:solidFill>
+          <a:ln>
+            <a:noFill/>
+          </a:ln>
+        </p:spPr>
+        <p:style>
+          <a:lnRef idx="2">
+            <a:schemeClr val="accent1">
+              <a:shade val="50000"/>
+            </a:schemeClr>
+          </a:lnRef>
+          <a:fillRef idx="1">
+            <a:schemeClr val="accent1"/>
+          </a:fillRef>
+          <a:effectRef idx="0">
+            <a:schemeClr val="accent1"/>
+          </a:effectRef>
+          <a:fontRef idx="minor">
+            <a:schemeClr val="lt1"/>
+          </a:fontRef>
+        </p:style>
+      </p:sp>
+    </p:spTree>
+    <p:extLst>
+      <p:ext uri="{BB962C8B-B14F-4D97-AF65-F5344CB8AC3E}">
+        <p14:creationId xmlns:p14="http://schemas.microsoft.com/office/powerpoint/2010/main" val="424613292"/>
+      </p:ext>
+    </p:extLst>
+  </p:cSld>
+  <p:clrMapOvr>
+    <a:masterClrMapping/>
+  </p:clrMapOvr>
+</p:sld>
+</file>
+
+<file path=ppt/slides/slide11.xml><?xml version="1.0" encoding="utf-8"?>
+<p:sld xmlns:a="http://schemas.openxmlformats.org/drawingml/2006/main" xmlns:r="http://schemas.openxmlformats.org/officeDocument/2006/relationships" xmlns:p="http://schemas.openxmlformats.org/presentationml/2006/main">
+  <p:cSld>
+    <p:spTree>
+      <p:nvGrpSpPr>
+        <p:cNvPr id="1" name=""/>
+        <p:cNvGrpSpPr/>
+        <p:nvPr/>
+      </p:nvGrpSpPr>
+      <p:grpSpPr>
+        <a:xfrm>
+          <a:off x="0" y="0"/>
+          <a:ext cx="0" cy="0"/>
+          <a:chOff x="0" y="0"/>
+          <a:chExt cx="0" cy="0"/>
+        </a:xfrm>
+      </p:grpSpPr>
+      <p:sp>
+        <p:nvSpPr>
+          <p:cNvPr id="2" name="Title 1">
+            <a:extLst>
+              <a:ext uri="{FF2B5EF4-FFF2-40B4-BE49-F238E27FC236}">
+                <a16:creationId xmlns:a16="http://schemas.microsoft.com/office/drawing/2014/main" id="{A1966945-46F7-4819-9BAA-10DC70F3D7BE}"/>
+              </a:ext>
+            </a:extLst>
+          </p:cNvPr>
+          <p:cNvSpPr>
+            <a:spLocks noGrp="1"/>
+          </p:cNvSpPr>
+          <p:nvPr>
+            <p:ph type="title"/>
+          </p:nvPr>
+        </p:nvSpPr>
+        <p:spPr/>
+        <p:txBody>
+          <a:bodyPr/>
+          <a:lstStyle/>
+          <a:p>
+            <a:r>
+              <a:rPr lang="en-US" dirty="0"/>
+              <a:t>Background Information - Arduino</a:t>
+            </a:r>
+          </a:p>
+        </p:txBody>
+      </p:sp>
+      <p:pic>
+        <p:nvPicPr>
+          <p:cNvPr id="7" name="Content Placeholder 6" descr="A screenshot of a cell phone&#10;&#10;Description automatically generated">
+            <a:extLst>
+              <a:ext uri="{FF2B5EF4-FFF2-40B4-BE49-F238E27FC236}">
+                <a16:creationId xmlns:a16="http://schemas.microsoft.com/office/drawing/2014/main" id="{CBC95435-C7FD-48E7-8E58-4594FAD4A7D1}"/>
+              </a:ext>
+            </a:extLst>
+          </p:cNvPr>
+          <p:cNvPicPr>
+            <a:picLocks noGrp="1" noChangeAspect="1"/>
+          </p:cNvPicPr>
+          <p:nvPr>
+            <p:ph sz="half" idx="1"/>
+          </p:nvPr>
+        </p:nvPicPr>
+        <p:blipFill>
+          <a:blip r:embed="rId2"/>
+          <a:stretch>
+            <a:fillRect/>
+          </a:stretch>
+        </p:blipFill>
+        <p:spPr>
+          <a:xfrm>
+            <a:off x="448779" y="2167128"/>
+            <a:ext cx="5146648" cy="2790788"/>
+          </a:xfrm>
+        </p:spPr>
+      </p:pic>
+      <p:sp>
+        <p:nvSpPr>
+          <p:cNvPr id="5" name="Content Placeholder 4">
+            <a:extLst>
+              <a:ext uri="{FF2B5EF4-FFF2-40B4-BE49-F238E27FC236}">
+                <a16:creationId xmlns:a16="http://schemas.microsoft.com/office/drawing/2014/main" id="{2C6941F4-E92C-4A34-975C-14F253D87B0E}"/>
+              </a:ext>
+            </a:extLst>
+          </p:cNvPr>
+          <p:cNvSpPr>
+            <a:spLocks noGrp="1"/>
+          </p:cNvSpPr>
+          <p:nvPr>
+            <p:ph sz="half" idx="2"/>
+          </p:nvPr>
+        </p:nvSpPr>
+        <p:spPr>
+          <a:xfrm>
+            <a:off x="6217920" y="1845734"/>
+            <a:ext cx="4937760" cy="4408761"/>
+          </a:xfrm>
+        </p:spPr>
+        <p:txBody>
+          <a:bodyPr>
+            <a:normAutofit lnSpcReduction="10000"/>
+          </a:bodyPr>
+          <a:lstStyle/>
+          <a:p>
+            <a:pPr>
+              <a:buFont typeface="Wingdings" panose="05000000000000000000" pitchFamily="2" charset="2"/>
+              <a:buChar char="§"/>
+            </a:pPr>
+            <a:r>
+              <a:rPr lang="en-US" dirty="0"/>
+              <a:t> Syntax is almost identical to C/C++</a:t>
+            </a:r>
+          </a:p>
+          <a:p>
+            <a:pPr>
+              <a:buFont typeface="Wingdings" panose="05000000000000000000" pitchFamily="2" charset="2"/>
+              <a:buChar char="§"/>
+            </a:pPr>
+            <a:r>
+              <a:rPr lang="en-US" dirty="0"/>
+              <a:t> setup() and loop() must always be present for Arduino code to compile</a:t>
+            </a:r>
+          </a:p>
+          <a:p>
+            <a:pPr>
+              <a:buFont typeface="Wingdings" panose="05000000000000000000" pitchFamily="2" charset="2"/>
+              <a:buChar char="§"/>
+            </a:pPr>
+            <a:r>
+              <a:rPr lang="en-US" dirty="0"/>
+              <a:t> setup() runs once, loop run repeatedly </a:t>
+            </a:r>
+          </a:p>
+          <a:p>
+            <a:pPr>
+              <a:buFont typeface="Wingdings" panose="05000000000000000000" pitchFamily="2" charset="2"/>
+              <a:buChar char="§"/>
+            </a:pPr>
+            <a:r>
+              <a:rPr lang="en-US" dirty="0"/>
+              <a:t> </a:t>
+            </a:r>
+            <a:r>
+              <a:rPr lang="en-US" dirty="0" err="1"/>
+              <a:t>Serial.begin</a:t>
+            </a:r>
+            <a:r>
+              <a:rPr lang="en-US" dirty="0"/>
+              <a:t>(9600) initializes the Serial monitor (a text window that we can print to)</a:t>
+            </a:r>
+          </a:p>
+          <a:p>
+            <a:pPr>
+              <a:buFont typeface="Wingdings" panose="05000000000000000000" pitchFamily="2" charset="2"/>
+              <a:buChar char="§"/>
+            </a:pPr>
+            <a:r>
+              <a:rPr lang="en-US" dirty="0"/>
+              <a:t>delay(int x) waits x milliseconds </a:t>
+            </a:r>
+          </a:p>
+          <a:p>
+            <a:pPr>
+              <a:buFont typeface="Wingdings" panose="05000000000000000000" pitchFamily="2" charset="2"/>
+              <a:buChar char="§"/>
+            </a:pPr>
+            <a:r>
+              <a:rPr lang="en-US" dirty="0"/>
+              <a:t>To use a pin:</a:t>
+            </a:r>
+          </a:p>
+          <a:p>
+            <a:pPr lvl="1">
+              <a:buFont typeface="Wingdings" panose="05000000000000000000" pitchFamily="2" charset="2"/>
+              <a:buChar char="§"/>
+            </a:pPr>
+            <a:r>
+              <a:rPr lang="en-US" dirty="0"/>
+              <a:t>First initialize it as either INPUT or OUTPUT using </a:t>
+            </a:r>
+            <a:r>
+              <a:rPr lang="en-US" dirty="0" err="1"/>
+              <a:t>pinMode</a:t>
+            </a:r>
+            <a:r>
+              <a:rPr lang="en-US" dirty="0"/>
+              <a:t>()</a:t>
+            </a:r>
+          </a:p>
+          <a:p>
+            <a:pPr lvl="1">
+              <a:buFont typeface="Wingdings" panose="05000000000000000000" pitchFamily="2" charset="2"/>
+              <a:buChar char="§"/>
+            </a:pPr>
+            <a:r>
+              <a:rPr lang="en-US" dirty="0" err="1"/>
+              <a:t>digitalWrite</a:t>
+            </a:r>
+            <a:r>
+              <a:rPr lang="en-US" dirty="0"/>
+              <a:t>(int </a:t>
+            </a:r>
+            <a:r>
+              <a:rPr lang="en-US" dirty="0" err="1"/>
+              <a:t>pinNumber</a:t>
+            </a:r>
+            <a:r>
+              <a:rPr lang="en-US" dirty="0"/>
+              <a:t>, HIGH or LOW)</a:t>
+            </a:r>
+          </a:p>
+          <a:p>
+            <a:pPr lvl="1">
+              <a:buFont typeface="Wingdings" panose="05000000000000000000" pitchFamily="2" charset="2"/>
+              <a:buChar char="§"/>
+            </a:pPr>
+            <a:r>
+              <a:rPr lang="en-US" dirty="0"/>
+              <a:t>More options will come in future labs</a:t>
+            </a:r>
+          </a:p>
+          <a:p>
+            <a:pPr lvl="1">
+              <a:buFont typeface="Wingdings" panose="05000000000000000000" pitchFamily="2" charset="2"/>
+              <a:buChar char="§"/>
+            </a:pPr>
+            <a:endParaRPr lang="en-US" dirty="0"/>
+          </a:p>
+        </p:txBody>
+      </p:sp>
+    </p:spTree>
+    <p:extLst>
+      <p:ext uri="{BB962C8B-B14F-4D97-AF65-F5344CB8AC3E}">
+        <p14:creationId xmlns:p14="http://schemas.microsoft.com/office/powerpoint/2010/main" val="1992057739"/>
+      </p:ext>
+    </p:extLst>
+  </p:cSld>
+  <p:clrMapOvr>
+    <a:masterClrMapping/>
+  </p:clrMapOvr>
+</p:sld>
+</file>
+
 <file path=ppt/slides/slide2.xml><?xml version="1.0" encoding="utf-8"?>
 <p:sld xmlns:a="http://schemas.openxmlformats.org/drawingml/2006/main" xmlns:r="http://schemas.openxmlformats.org/officeDocument/2006/relationships" xmlns:p="http://schemas.openxmlformats.org/presentationml/2006/main">
   <p:cSld>
@@ -3929,7 +4735,7 @@
           <a:p>
             <a:r>
               <a:rPr lang="en-US" dirty="0"/>
-              <a:t>Contact Info</a:t>
+              <a:t>Contact Info + websites</a:t>
             </a:r>
           </a:p>
         </p:txBody>
@@ -3994,7 +4800,54 @@
             </a:r>
             <a:r>
               <a:rPr lang="en-US" dirty="0"/>
-              <a:t>by appointment only (send an email and we can setup a zoom meeting)</a:t>
+              <a:t>by appointment only (send an email and I will setup a zoom meeting)</a:t>
+            </a:r>
+          </a:p>
+          <a:p>
+            <a:pPr>
+              <a:buFont typeface="Wingdings" panose="05000000000000000000" pitchFamily="2" charset="2"/>
+              <a:buChar char="§"/>
+            </a:pPr>
+            <a:endParaRPr lang="en-US" dirty="0"/>
+          </a:p>
+          <a:p>
+            <a:pPr>
+              <a:buFont typeface="Wingdings" panose="05000000000000000000" pitchFamily="2" charset="2"/>
+              <a:buChar char="§"/>
+            </a:pPr>
+            <a:r>
+              <a:rPr lang="en-US" dirty="0"/>
+              <a:t> I will use piazza to post any class updates</a:t>
+            </a:r>
+          </a:p>
+          <a:p>
+            <a:pPr>
+              <a:buFont typeface="Wingdings" panose="05000000000000000000" pitchFamily="2" charset="2"/>
+              <a:buChar char="§"/>
+            </a:pPr>
+            <a:r>
+              <a:rPr lang="en-US" dirty="0"/>
+              <a:t> Zoom links are posted on piazza</a:t>
+            </a:r>
+          </a:p>
+          <a:p>
+            <a:pPr>
+              <a:buFont typeface="Wingdings" panose="05000000000000000000" pitchFamily="2" charset="2"/>
+              <a:buChar char="§"/>
+            </a:pPr>
+            <a:r>
+              <a:rPr lang="en-US" dirty="0"/>
+              <a:t> My slides, starter codes, and instructions are available here: </a:t>
+            </a:r>
+            <a:r>
+              <a:rPr lang="en-US" dirty="0">
+                <a:hlinkClick r:id="rId3"/>
+              </a:rPr>
+              <a:t>github.com/jack17davis/cs341</a:t>
+            </a:r>
+            <a:r>
+              <a:rPr lang="en-US" dirty="0"/>
+              <a:t> </a:t>
             </a:r>
           </a:p>
         </p:txBody>
@@ -4052,7 +4905,7 @@
           <a:p>
             <a:r>
               <a:rPr lang="en-US" dirty="0"/>
-              <a:t>Weekly Meetings</a:t>
+              <a:t>Policies</a:t>
             </a:r>
           </a:p>
         </p:txBody>
@@ -4073,12 +4926,7 @@
             <p:ph idx="1"/>
           </p:nvPr>
         </p:nvSpPr>
-        <p:spPr>
-          <a:xfrm>
-            <a:off x="1097280" y="1818302"/>
-            <a:ext cx="10058400" cy="4023360"/>
-          </a:xfrm>
-        </p:spPr>
+        <p:spPr/>
         <p:txBody>
           <a:bodyPr/>
           <a:lstStyle/>
@@ -4089,15 +4937,8 @@
             </a:pPr>
             <a:r>
               <a:rPr lang="en-US" dirty="0"/>
-              <a:t> Starter code is available on GitHub: </a:t>
-            </a:r>
-            <a:r>
-              <a:rPr lang="en-US" dirty="0">
-                <a:hlinkClick r:id="rId2"/>
-              </a:rPr>
-              <a:t>https://github.com/jack17davis/cs341</a:t>
-            </a:r>
-            <a:endParaRPr lang="en-US" dirty="0"/>
+              <a:t> Work in groups of 1 or 2</a:t>
+            </a:r>
           </a:p>
           <a:p>
             <a:pPr>
@@ -4106,18 +4947,9 @@
             </a:pPr>
             <a:r>
               <a:rPr lang="en-US" dirty="0"/>
-              <a:t> Step-by-step instructions will be posted on </a:t>
-            </a:r>
-            <a:r>
-              <a:rPr lang="en-US" dirty="0">
-                <a:hlinkClick r:id="rId3"/>
-              </a:rPr>
-              <a:t>https://www.cs.umb.edu/~cheungr/cs341/</a:t>
-            </a:r>
-            <a:r>
-              <a:rPr lang="en-US" dirty="0"/>
-              <a:t>  </a:t>
-            </a:r>
+              <a:t> Post lab questions on Piazza with lab tag (privately if you need to share code) </a:t>
+            </a:r>
+            <a:endParaRPr lang="en-US" b="1" dirty="0"/>
           </a:p>
           <a:p>
             <a:pPr>
@@ -4126,7 +4958,15 @@
             </a:pPr>
             <a:r>
               <a:rPr lang="en-US" dirty="0"/>
-              <a:t> Lab introduction</a:t>
+              <a:t> makeup labs are allowed (due by 11:59PM on December 11</a:t>
+            </a:r>
+            <a:r>
+              <a:rPr lang="en-US" baseline="30000" dirty="0"/>
+              <a:t>th</a:t>
+            </a:r>
+            <a:r>
+              <a:rPr lang="en-US" dirty="0"/>
+              <a:t>)</a:t>
             </a:r>
           </a:p>
           <a:p>
@@ -4136,7 +4976,7 @@
             </a:pPr>
             <a:r>
               <a:rPr lang="en-US" dirty="0"/>
-              <a:t> Working lab demonstration</a:t>
+              <a:t> You may attend a different lab section if you need to</a:t>
             </a:r>
           </a:p>
           <a:p>
@@ -4146,47 +4986,7 @@
             </a:pPr>
             <a:r>
               <a:rPr lang="en-US" dirty="0"/>
-              <a:t> Q&amp;A</a:t>
-            </a:r>
-          </a:p>
-          <a:p>
-            <a:pPr>
-              <a:buFont typeface="Wingdings" panose="05000000000000000000" pitchFamily="2" charset="2"/>
-              <a:buChar char="§"/>
-            </a:pPr>
-            <a:r>
-              <a:rPr lang="en-US" dirty="0"/>
-              <a:t> Breakout rooms for real-time labs</a:t>
-            </a:r>
-          </a:p>
-          <a:p>
-            <a:pPr lvl="1">
-              <a:buFont typeface="Wingdings" panose="05000000000000000000" pitchFamily="2" charset="2"/>
-              <a:buChar char="§"/>
-            </a:pPr>
-            <a:r>
-              <a:rPr lang="en-US" dirty="0"/>
-              <a:t>Use the “help” button to get my attention</a:t>
-            </a:r>
-          </a:p>
-          <a:p>
-            <a:pPr lvl="1">
-              <a:buFont typeface="Wingdings" panose="05000000000000000000" pitchFamily="2" charset="2"/>
-              <a:buChar char="§"/>
-            </a:pPr>
-            <a:r>
-              <a:rPr lang="en-US" dirty="0"/>
-              <a:t>You are welcome to take longer or leave early</a:t>
-            </a:r>
-          </a:p>
-          <a:p>
-            <a:pPr>
-              <a:buFont typeface="Wingdings" panose="05000000000000000000" pitchFamily="2" charset="2"/>
-              <a:buChar char="§"/>
-            </a:pPr>
-            <a:r>
-              <a:rPr lang="en-US" dirty="0"/>
-              <a:t> Lab report is due by the start of the next lab (typically a week)</a:t>
+              <a:t> When using tinkercad, you should not use block code</a:t>
             </a:r>
           </a:p>
         </p:txBody>
@@ -4194,7 +4994,7 @@
     </p:spTree>
     <p:extLst>
       <p:ext uri="{BB962C8B-B14F-4D97-AF65-F5344CB8AC3E}">
-        <p14:creationId xmlns:p14="http://schemas.microsoft.com/office/powerpoint/2010/main" val="1769291969"/>
+        <p14:creationId xmlns:p14="http://schemas.microsoft.com/office/powerpoint/2010/main" val="1605370376"/>
       </p:ext>
     </p:extLst>
   </p:cSld>
@@ -4207,14 +5007,6 @@
 <file path=ppt/slides/slide4.xml><?xml version="1.0" encoding="utf-8"?>
 <p:sld xmlns:a="http://schemas.openxmlformats.org/drawingml/2006/main" xmlns:r="http://schemas.openxmlformats.org/officeDocument/2006/relationships" xmlns:p="http://schemas.openxmlformats.org/presentationml/2006/main">
   <p:cSld>
-    <p:bg>
-      <p:bgPr>
-        <a:solidFill>
-          <a:schemeClr val="bg1"/>
-        </a:solidFill>
-        <a:effectLst/>
-      </p:bgPr>
-    </p:bg>
     <p:spTree>
       <p:nvGrpSpPr>
         <p:cNvPr id="1" name=""/>
@@ -4231,231 +5023,6 @@
       </p:grpSpPr>
       <p:sp>
         <p:nvSpPr>
-          <p:cNvPr id="16" name="Rectangle 15">
-            <a:extLst>
-              <a:ext uri="{FF2B5EF4-FFF2-40B4-BE49-F238E27FC236}">
-                <a16:creationId xmlns:a16="http://schemas.microsoft.com/office/drawing/2014/main" id="{BB2B8762-61F0-4F1B-9364-D633EE9D6AF5}"/>
-              </a:ext>
-              <a:ext uri="{C183D7F6-B498-43B3-948B-1728B52AA6E4}">
-                <adec:decorative xmlns:adec="http://schemas.microsoft.com/office/drawing/2017/decorative" val="1"/>
-              </a:ext>
-            </a:extLst>
-          </p:cNvPr>
-          <p:cNvSpPr>
-            <a:spLocks noGrp="1" noRot="1" noChangeAspect="1" noMove="1" noResize="1" noEditPoints="1" noAdjustHandles="1" noChangeArrowheads="1" noChangeShapeType="1" noTextEdit="1"/>
-          </p:cNvSpPr>
-          <p:nvPr>
-            <p:extLst>
-              <p:ext uri="{386F3935-93C4-4BCD-93E2-E3B085C9AB24}">
-                <p16:designElem xmlns:p16="http://schemas.microsoft.com/office/powerpoint/2015/main" val="1"/>
-              </p:ext>
-            </p:extLst>
-          </p:nvPr>
-        </p:nvSpPr>
-        <p:spPr>
-          <a:xfrm>
-            <a:off x="3175" y="6400800"/>
-            <a:ext cx="12188825" cy="457200"/>
-          </a:xfrm>
-          <a:prstGeom prst="rect">
-            <a:avLst/>
-          </a:prstGeom>
-          <a:solidFill>
-            <a:schemeClr val="accent2"/>
-          </a:solidFill>
-          <a:ln>
-            <a:noFill/>
-          </a:ln>
-        </p:spPr>
-        <p:style>
-          <a:lnRef idx="2">
-            <a:schemeClr val="accent1">
-              <a:shade val="50000"/>
-            </a:schemeClr>
-          </a:lnRef>
-          <a:fillRef idx="1">
-            <a:schemeClr val="accent1"/>
-          </a:fillRef>
-          <a:effectRef idx="0">
-            <a:schemeClr val="accent1"/>
-          </a:effectRef>
-          <a:fontRef idx="minor">
-            <a:schemeClr val="lt1"/>
-          </a:fontRef>
-        </p:style>
-      </p:sp>
-      <p:sp>
-        <p:nvSpPr>
-          <p:cNvPr id="18" name="Rectangle 17">
-            <a:extLst>
-              <a:ext uri="{FF2B5EF4-FFF2-40B4-BE49-F238E27FC236}">
-                <a16:creationId xmlns:a16="http://schemas.microsoft.com/office/drawing/2014/main" id="{E97675C8-1328-460C-9EBF-6B446B67EAD3}"/>
-              </a:ext>
-              <a:ext uri="{C183D7F6-B498-43B3-948B-1728B52AA6E4}">
-                <adec:decorative xmlns:adec="http://schemas.microsoft.com/office/drawing/2017/decorative" val="1"/>
-              </a:ext>
-            </a:extLst>
-          </p:cNvPr>
-          <p:cNvSpPr>
-            <a:spLocks noGrp="1" noRot="1" noChangeAspect="1" noMove="1" noResize="1" noEditPoints="1" noAdjustHandles="1" noChangeArrowheads="1" noChangeShapeType="1" noTextEdit="1"/>
-          </p:cNvSpPr>
-          <p:nvPr>
-            <p:extLst>
-              <p:ext uri="{386F3935-93C4-4BCD-93E2-E3B085C9AB24}">
-                <p16:designElem xmlns:p16="http://schemas.microsoft.com/office/powerpoint/2015/main" val="1"/>
-              </p:ext>
-            </p:extLst>
-          </p:nvPr>
-        </p:nvSpPr>
-        <p:spPr>
-          <a:xfrm>
-            <a:off x="15" y="6334316"/>
-            <a:ext cx="12188825" cy="64008"/>
-          </a:xfrm>
-          <a:prstGeom prst="rect">
-            <a:avLst/>
-          </a:prstGeom>
-          <a:solidFill>
-            <a:schemeClr val="accent1"/>
-          </a:solidFill>
-          <a:ln>
-            <a:noFill/>
-          </a:ln>
-        </p:spPr>
-        <p:style>
-          <a:lnRef idx="2">
-            <a:schemeClr val="accent1">
-              <a:shade val="50000"/>
-            </a:schemeClr>
-          </a:lnRef>
-          <a:fillRef idx="1">
-            <a:schemeClr val="accent1"/>
-          </a:fillRef>
-          <a:effectRef idx="0">
-            <a:schemeClr val="accent1"/>
-          </a:effectRef>
-          <a:fontRef idx="minor">
-            <a:schemeClr val="lt1"/>
-          </a:fontRef>
-        </p:style>
-      </p:sp>
-      <p:cxnSp>
-        <p:nvCxnSpPr>
-          <p:cNvPr id="20" name="Straight Connector 19">
-            <a:extLst>
-              <a:ext uri="{FF2B5EF4-FFF2-40B4-BE49-F238E27FC236}">
-                <a16:creationId xmlns:a16="http://schemas.microsoft.com/office/drawing/2014/main" id="{514EE78B-AF71-4195-A01B-F1165D9233BF}"/>
-              </a:ext>
-              <a:ext uri="{C183D7F6-B498-43B3-948B-1728B52AA6E4}">
-                <adec:decorative xmlns:adec="http://schemas.microsoft.com/office/drawing/2017/decorative" val="1"/>
-              </a:ext>
-            </a:extLst>
-          </p:cNvPr>
-          <p:cNvCxnSpPr>
-            <a:cxnSpLocks noGrp="1" noRot="1" noChangeAspect="1" noMove="1" noResize="1" noEditPoints="1" noAdjustHandles="1" noChangeArrowheads="1" noChangeShapeType="1"/>
-          </p:cNvCxnSpPr>
-          <p:nvPr>
-            <p:extLst>
-              <p:ext uri="{386F3935-93C4-4BCD-93E2-E3B085C9AB24}">
-                <p16:designElem xmlns:p16="http://schemas.microsoft.com/office/powerpoint/2015/main" val="1"/>
-              </p:ext>
-            </p:extLst>
-          </p:nvPr>
-        </p:nvCxnSpPr>
-        <p:spPr>
-          <a:xfrm>
-            <a:off x="1207658" y="4343400"/>
-            <a:ext cx="9875520" cy="0"/>
-          </a:xfrm>
-          <a:prstGeom prst="line">
-            <a:avLst/>
-          </a:prstGeom>
-          <a:ln w="6350">
-            <a:solidFill>
-              <a:schemeClr val="tx1">
-                <a:lumMod val="50000"/>
-                <a:lumOff val="50000"/>
-              </a:schemeClr>
-            </a:solidFill>
-          </a:ln>
-        </p:spPr>
-        <p:style>
-          <a:lnRef idx="1">
-            <a:schemeClr val="accent1"/>
-          </a:lnRef>
-          <a:fillRef idx="0">
-            <a:schemeClr val="accent1"/>
-          </a:fillRef>
-          <a:effectRef idx="0">
-            <a:schemeClr val="accent1"/>
-          </a:effectRef>
-          <a:fontRef idx="minor">
-            <a:schemeClr val="tx1"/>
-          </a:fontRef>
-        </p:style>
-      </p:cxnSp>
-      <p:sp useBgFill="1">
-        <p:nvSpPr>
-          <p:cNvPr id="22" name="Rectangle 21">
-            <a:extLst>
-              <a:ext uri="{FF2B5EF4-FFF2-40B4-BE49-F238E27FC236}">
-                <a16:creationId xmlns:a16="http://schemas.microsoft.com/office/drawing/2014/main" id="{C6417104-D4C1-4710-9982-2154A7F48492}"/>
-              </a:ext>
-              <a:ext uri="{C183D7F6-B498-43B3-948B-1728B52AA6E4}">
-                <adec:decorative xmlns:adec="http://schemas.microsoft.com/office/drawing/2017/decorative" val="1"/>
-              </a:ext>
-            </a:extLst>
-          </p:cNvPr>
-          <p:cNvSpPr>
-            <a:spLocks noGrp="1" noRot="1" noChangeAspect="1" noMove="1" noResize="1" noEditPoints="1" noAdjustHandles="1" noChangeArrowheads="1" noChangeShapeType="1" noTextEdit="1"/>
-          </p:cNvSpPr>
-          <p:nvPr>
-            <p:extLst>
-              <p:ext uri="{386F3935-93C4-4BCD-93E2-E3B085C9AB24}">
-                <p16:designElem xmlns:p16="http://schemas.microsoft.com/office/powerpoint/2015/main" val="1"/>
-              </p:ext>
-            </p:extLst>
-          </p:nvPr>
-        </p:nvSpPr>
-        <p:spPr>
-          <a:xfrm>
-            <a:off x="0" y="0"/>
-            <a:ext cx="12192001" cy="6334316"/>
-          </a:xfrm>
-          <a:prstGeom prst="rect">
-            <a:avLst/>
-          </a:prstGeom>
-          <a:ln>
-            <a:noFill/>
-          </a:ln>
-        </p:spPr>
-        <p:style>
-          <a:lnRef idx="2">
-            <a:schemeClr val="accent1">
-              <a:shade val="50000"/>
-            </a:schemeClr>
-          </a:lnRef>
-          <a:fillRef idx="1">
-            <a:schemeClr val="accent1"/>
-          </a:fillRef>
-          <a:effectRef idx="0">
-            <a:schemeClr val="accent1"/>
-          </a:effectRef>
-          <a:fontRef idx="minor">
-            <a:schemeClr val="lt1"/>
-          </a:fontRef>
-        </p:style>
-        <p:txBody>
-          <a:bodyPr rtlCol="0" anchor="ctr"/>
-          <a:lstStyle/>
-          <a:p>
-            <a:pPr algn="ctr"/>
-            <a:endParaRPr lang="en-US"/>
-          </a:p>
-        </p:txBody>
-      </p:sp>
-      <p:sp>
-        <p:nvSpPr>
           <p:cNvPr id="2" name="Title 1">
             <a:extLst>
               <a:ext uri="{FF2B5EF4-FFF2-40B4-BE49-F238E27FC236}">
@@ -4470,320 +5037,156 @@
             <p:ph type="title"/>
           </p:nvPr>
         </p:nvSpPr>
-        <p:spPr>
-          <a:xfrm>
-            <a:off x="633999" y="4550229"/>
-            <a:ext cx="10909073" cy="1057655"/>
-          </a:xfrm>
-        </p:spPr>
-        <p:txBody>
-          <a:bodyPr vert="horz" lIns="91440" tIns="45720" rIns="91440" bIns="45720" rtlCol="0" anchor="b">
-            <a:normAutofit/>
-          </a:bodyPr>
+        <p:spPr/>
+        <p:txBody>
+          <a:bodyPr/>
           <a:lstStyle/>
           <a:p>
             <a:r>
-              <a:rPr lang="en-US" sz="6000" dirty="0">
-                <a:solidFill>
-                  <a:schemeClr val="tx1">
-                    <a:lumMod val="85000"/>
-                    <a:lumOff val="15000"/>
-                  </a:schemeClr>
-                </a:solidFill>
-              </a:rPr>
-              <a:t>Arduino</a:t>
-            </a:r>
-          </a:p>
-        </p:txBody>
-      </p:sp>
-      <p:pic>
-        <p:nvPicPr>
-          <p:cNvPr id="7" name="Picture 6" descr="A circuit board&#10;&#10;Description automatically generated">
+              <a:rPr lang="en-US" dirty="0"/>
+              <a:t>Weekly Meetings</a:t>
+            </a:r>
+          </a:p>
+        </p:txBody>
+      </p:sp>
+      <p:sp>
+        <p:nvSpPr>
+          <p:cNvPr id="3" name="Content Placeholder 2">
             <a:extLst>
               <a:ext uri="{FF2B5EF4-FFF2-40B4-BE49-F238E27FC236}">
-                <a16:creationId xmlns:a16="http://schemas.microsoft.com/office/drawing/2014/main" id="{C14371A5-8CDD-476A-BA30-1A7C69E92320}"/>
+                <a16:creationId xmlns:a16="http://schemas.microsoft.com/office/drawing/2014/main" id="{1A29CAEF-11FA-41AA-9D72-16A9967E06F5}"/>
               </a:ext>
             </a:extLst>
           </p:cNvPr>
-          <p:cNvPicPr>
-            <a:picLocks noChangeAspect="1"/>
-          </p:cNvPicPr>
-          <p:nvPr/>
-        </p:nvPicPr>
-        <p:blipFill>
-          <a:blip r:embed="rId2"/>
-          <a:stretch>
-            <a:fillRect/>
-          </a:stretch>
-        </p:blipFill>
-        <p:spPr>
-          <a:xfrm>
-            <a:off x="635457" y="1197777"/>
-            <a:ext cx="5131653" cy="2487342"/>
-          </a:xfrm>
-          <a:prstGeom prst="rect">
-            <a:avLst/>
-          </a:prstGeom>
-        </p:spPr>
-      </p:pic>
-      <p:sp>
-        <p:nvSpPr>
-          <p:cNvPr id="24" name="Rectangle 23">
-            <a:extLst>
-              <a:ext uri="{FF2B5EF4-FFF2-40B4-BE49-F238E27FC236}">
-                <a16:creationId xmlns:a16="http://schemas.microsoft.com/office/drawing/2014/main" id="{626F1402-2DEC-4071-84AF-350C7BF00D43}"/>
-              </a:ext>
-              <a:ext uri="{C183D7F6-B498-43B3-948B-1728B52AA6E4}">
-                <adec:decorative xmlns:adec="http://schemas.microsoft.com/office/drawing/2017/decorative" val="1"/>
-              </a:ext>
-            </a:extLst>
-          </p:cNvPr>
-          <p:cNvSpPr>
-            <a:spLocks noGrp="1" noRot="1" noChangeAspect="1" noMove="1" noResize="1" noEditPoints="1" noAdjustHandles="1" noChangeArrowheads="1" noChangeShapeType="1" noTextEdit="1"/>
-          </p:cNvSpPr>
-          <p:nvPr>
-            <p:extLst>
-              <p:ext uri="{386F3935-93C4-4BCD-93E2-E3B085C9AB24}">
-                <p16:designElem xmlns:p16="http://schemas.microsoft.com/office/powerpoint/2015/main" val="1"/>
-              </p:ext>
-            </p:extLst>
-          </p:nvPr>
-        </p:nvSpPr>
-        <p:spPr>
-          <a:xfrm>
-            <a:off x="6063996" y="886968"/>
-            <a:ext cx="64008" cy="3108960"/>
-          </a:xfrm>
-          <a:prstGeom prst="rect">
-            <a:avLst/>
-          </a:prstGeom>
-          <a:ln>
-            <a:noFill/>
-          </a:ln>
-        </p:spPr>
-        <p:style>
-          <a:lnRef idx="2">
-            <a:schemeClr val="accent1">
-              <a:shade val="50000"/>
-            </a:schemeClr>
-          </a:lnRef>
-          <a:fillRef idx="1">
-            <a:schemeClr val="accent1"/>
-          </a:fillRef>
-          <a:effectRef idx="0">
-            <a:schemeClr val="accent1"/>
-          </a:effectRef>
-          <a:fontRef idx="minor">
-            <a:schemeClr val="lt1"/>
-          </a:fontRef>
-        </p:style>
-        <p:txBody>
-          <a:bodyPr rtlCol="0" anchor="ctr"/>
+          <p:cNvSpPr>
+            <a:spLocks noGrp="1"/>
+          </p:cNvSpPr>
+          <p:nvPr>
+            <p:ph idx="1"/>
+          </p:nvPr>
+        </p:nvSpPr>
+        <p:spPr>
+          <a:xfrm>
+            <a:off x="1097280" y="1818302"/>
+            <a:ext cx="10058400" cy="4023360"/>
+          </a:xfrm>
+        </p:spPr>
+        <p:txBody>
+          <a:bodyPr/>
           <a:lstStyle/>
           <a:p>
-            <a:pPr algn="ctr"/>
-            <a:endParaRPr lang="en-US"/>
-          </a:p>
-        </p:txBody>
-      </p:sp>
-      <p:pic>
-        <p:nvPicPr>
-          <p:cNvPr id="11" name="Picture 10" descr="A circuit board&#10;&#10;Description automatically generated">
-            <a:extLst>
-              <a:ext uri="{FF2B5EF4-FFF2-40B4-BE49-F238E27FC236}">
-                <a16:creationId xmlns:a16="http://schemas.microsoft.com/office/drawing/2014/main" id="{9F05A8B3-435D-4DE3-912A-AC3D4964937C}"/>
-              </a:ext>
-            </a:extLst>
-          </p:cNvPr>
-          <p:cNvPicPr>
-            <a:picLocks noChangeAspect="1"/>
-          </p:cNvPicPr>
-          <p:nvPr/>
-        </p:nvPicPr>
-        <p:blipFill>
-          <a:blip r:embed="rId3"/>
-          <a:stretch>
-            <a:fillRect/>
-          </a:stretch>
-        </p:blipFill>
-        <p:spPr>
-          <a:xfrm>
-            <a:off x="6424891" y="682073"/>
-            <a:ext cx="5118182" cy="3518750"/>
-          </a:xfrm>
-          <a:prstGeom prst="rect">
-            <a:avLst/>
-          </a:prstGeom>
-        </p:spPr>
-      </p:pic>
-      <p:cxnSp>
-        <p:nvCxnSpPr>
-          <p:cNvPr id="26" name="Straight Connector 25">
-            <a:extLst>
-              <a:ext uri="{FF2B5EF4-FFF2-40B4-BE49-F238E27FC236}">
-                <a16:creationId xmlns:a16="http://schemas.microsoft.com/office/drawing/2014/main" id="{04733B62-1719-4677-A612-CA0AC0AD7482}"/>
-              </a:ext>
-              <a:ext uri="{C183D7F6-B498-43B3-948B-1728B52AA6E4}">
-                <adec:decorative xmlns:adec="http://schemas.microsoft.com/office/drawing/2017/decorative" val="1"/>
-              </a:ext>
-            </a:extLst>
-          </p:cNvPr>
-          <p:cNvCxnSpPr>
-            <a:cxnSpLocks noGrp="1" noRot="1" noChangeAspect="1" noMove="1" noResize="1" noEditPoints="1" noAdjustHandles="1" noChangeArrowheads="1" noChangeShapeType="1"/>
-          </p:cNvCxnSpPr>
-          <p:nvPr>
-            <p:extLst>
-              <p:ext uri="{386F3935-93C4-4BCD-93E2-E3B085C9AB24}">
-                <p16:designElem xmlns:p16="http://schemas.microsoft.com/office/powerpoint/2015/main" val="1"/>
-              </p:ext>
-            </p:extLst>
-          </p:nvPr>
-        </p:nvCxnSpPr>
-        <p:spPr>
-          <a:xfrm>
-            <a:off x="721086" y="5618770"/>
-            <a:ext cx="10515600" cy="0"/>
-          </a:xfrm>
-          <a:prstGeom prst="line">
-            <a:avLst/>
-          </a:prstGeom>
-          <a:ln w="6350">
-            <a:solidFill>
-              <a:schemeClr val="tx2">
-                <a:alpha val="90000"/>
-              </a:schemeClr>
-            </a:solidFill>
-          </a:ln>
-        </p:spPr>
-        <p:style>
-          <a:lnRef idx="1">
-            <a:schemeClr val="accent1"/>
-          </a:lnRef>
-          <a:fillRef idx="0">
-            <a:schemeClr val="accent1"/>
-          </a:fillRef>
-          <a:effectRef idx="0">
-            <a:schemeClr val="accent1"/>
-          </a:effectRef>
-          <a:fontRef idx="minor">
-            <a:schemeClr val="tx1"/>
-          </a:fontRef>
-        </p:style>
-      </p:cxnSp>
-      <p:sp>
-        <p:nvSpPr>
-          <p:cNvPr id="28" name="Rectangle 27">
-            <a:extLst>
-              <a:ext uri="{FF2B5EF4-FFF2-40B4-BE49-F238E27FC236}">
-                <a16:creationId xmlns:a16="http://schemas.microsoft.com/office/drawing/2014/main" id="{DA52A394-10F4-4AA5-90E4-634D1E919DBA}"/>
-              </a:ext>
-              <a:ext uri="{C183D7F6-B498-43B3-948B-1728B52AA6E4}">
-                <adec:decorative xmlns:adec="http://schemas.microsoft.com/office/drawing/2017/decorative" val="1"/>
-              </a:ext>
-            </a:extLst>
-          </p:cNvPr>
-          <p:cNvSpPr>
-            <a:spLocks noGrp="1" noRot="1" noChangeAspect="1" noMove="1" noResize="1" noEditPoints="1" noAdjustHandles="1" noChangeArrowheads="1" noChangeShapeType="1" noTextEdit="1"/>
-          </p:cNvSpPr>
-          <p:nvPr>
-            <p:extLst>
-              <p:ext uri="{386F3935-93C4-4BCD-93E2-E3B085C9AB24}">
-                <p16:designElem xmlns:p16="http://schemas.microsoft.com/office/powerpoint/2015/main" val="1"/>
-              </p:ext>
-            </p:extLst>
-          </p:nvPr>
-        </p:nvSpPr>
-        <p:spPr>
-          <a:xfrm>
-            <a:off x="15" y="6334316"/>
-            <a:ext cx="12191985" cy="66484"/>
-          </a:xfrm>
-          <a:prstGeom prst="rect">
-            <a:avLst/>
-          </a:prstGeom>
-          <a:solidFill>
-            <a:schemeClr val="accent1"/>
-          </a:solidFill>
-          <a:ln>
-            <a:noFill/>
-          </a:ln>
-        </p:spPr>
-        <p:style>
-          <a:lnRef idx="2">
-            <a:schemeClr val="accent1">
-              <a:shade val="50000"/>
-            </a:schemeClr>
-          </a:lnRef>
-          <a:fillRef idx="1">
-            <a:schemeClr val="accent1"/>
-          </a:fillRef>
-          <a:effectRef idx="0">
-            <a:schemeClr val="accent1"/>
-          </a:effectRef>
-          <a:fontRef idx="minor">
-            <a:schemeClr val="lt1"/>
-          </a:fontRef>
-        </p:style>
-      </p:sp>
-      <p:sp>
-        <p:nvSpPr>
-          <p:cNvPr id="30" name="Rectangle 29">
-            <a:extLst>
-              <a:ext uri="{FF2B5EF4-FFF2-40B4-BE49-F238E27FC236}">
-                <a16:creationId xmlns:a16="http://schemas.microsoft.com/office/drawing/2014/main" id="{07BDDC51-8BB2-42BE-8EA8-39B3E9AC1EF6}"/>
-              </a:ext>
-              <a:ext uri="{C183D7F6-B498-43B3-948B-1728B52AA6E4}">
-                <adec:decorative xmlns:adec="http://schemas.microsoft.com/office/drawing/2017/decorative" val="1"/>
-              </a:ext>
-            </a:extLst>
-          </p:cNvPr>
-          <p:cNvSpPr>
-            <a:spLocks noGrp="1" noRot="1" noChangeAspect="1" noMove="1" noResize="1" noEditPoints="1" noAdjustHandles="1" noChangeArrowheads="1" noChangeShapeType="1" noTextEdit="1"/>
-          </p:cNvSpPr>
-          <p:nvPr>
-            <p:extLst>
-              <p:ext uri="{386F3935-93C4-4BCD-93E2-E3B085C9AB24}">
-                <p16:designElem xmlns:p16="http://schemas.microsoft.com/office/powerpoint/2015/main" val="1"/>
-              </p:ext>
-            </p:extLst>
-          </p:nvPr>
-        </p:nvSpPr>
-        <p:spPr>
-          <a:xfrm>
-            <a:off x="1" y="6400800"/>
-            <a:ext cx="12192000" cy="457200"/>
-          </a:xfrm>
-          <a:prstGeom prst="rect">
-            <a:avLst/>
-          </a:prstGeom>
-          <a:solidFill>
-            <a:schemeClr val="accent2"/>
-          </a:solidFill>
-          <a:ln>
-            <a:noFill/>
-          </a:ln>
-        </p:spPr>
-        <p:style>
-          <a:lnRef idx="2">
-            <a:schemeClr val="accent1">
-              <a:shade val="50000"/>
-            </a:schemeClr>
-          </a:lnRef>
-          <a:fillRef idx="1">
-            <a:schemeClr val="accent1"/>
-          </a:fillRef>
-          <a:effectRef idx="0">
-            <a:schemeClr val="accent1"/>
-          </a:effectRef>
-          <a:fontRef idx="minor">
-            <a:schemeClr val="lt1"/>
-          </a:fontRef>
-        </p:style>
+            <a:pPr>
+              <a:buFont typeface="Wingdings" panose="05000000000000000000" pitchFamily="2" charset="2"/>
+              <a:buChar char="§"/>
+            </a:pPr>
+            <a:r>
+              <a:rPr lang="en-US" dirty="0"/>
+              <a:t> Starter code is available on GitHub: </a:t>
+            </a:r>
+            <a:r>
+              <a:rPr lang="en-US" dirty="0">
+                <a:hlinkClick r:id="rId2"/>
+              </a:rPr>
+              <a:t>https://github.com/jack17davis/cs341</a:t>
+            </a:r>
+            <a:endParaRPr lang="en-US" dirty="0"/>
+          </a:p>
+          <a:p>
+            <a:pPr>
+              <a:buFont typeface="Wingdings" panose="05000000000000000000" pitchFamily="2" charset="2"/>
+              <a:buChar char="§"/>
+            </a:pPr>
+            <a:r>
+              <a:rPr lang="en-US" dirty="0"/>
+              <a:t> Step-by-step instructions will be posted on </a:t>
+            </a:r>
+            <a:r>
+              <a:rPr lang="en-US" dirty="0">
+                <a:hlinkClick r:id="rId3"/>
+              </a:rPr>
+              <a:t>https://www.cs.umb.edu/~cheungr/cs341/</a:t>
+            </a:r>
+            <a:r>
+              <a:rPr lang="en-US" dirty="0"/>
+              <a:t>  </a:t>
+            </a:r>
+          </a:p>
+          <a:p>
+            <a:pPr>
+              <a:buFont typeface="Wingdings" panose="05000000000000000000" pitchFamily="2" charset="2"/>
+              <a:buChar char="§"/>
+            </a:pPr>
+            <a:r>
+              <a:rPr lang="en-US" dirty="0"/>
+              <a:t> Lab introduction</a:t>
+            </a:r>
+          </a:p>
+          <a:p>
+            <a:pPr>
+              <a:buFont typeface="Wingdings" panose="05000000000000000000" pitchFamily="2" charset="2"/>
+              <a:buChar char="§"/>
+            </a:pPr>
+            <a:r>
+              <a:rPr lang="en-US" dirty="0"/>
+              <a:t> Working lab demonstration</a:t>
+            </a:r>
+          </a:p>
+          <a:p>
+            <a:pPr>
+              <a:buFont typeface="Wingdings" panose="05000000000000000000" pitchFamily="2" charset="2"/>
+              <a:buChar char="§"/>
+            </a:pPr>
+            <a:r>
+              <a:rPr lang="en-US" dirty="0"/>
+              <a:t> Q&amp;A</a:t>
+            </a:r>
+          </a:p>
+          <a:p>
+            <a:pPr>
+              <a:buFont typeface="Wingdings" panose="05000000000000000000" pitchFamily="2" charset="2"/>
+              <a:buChar char="§"/>
+            </a:pPr>
+            <a:r>
+              <a:rPr lang="en-US" dirty="0"/>
+              <a:t> Breakout rooms for real-time labs</a:t>
+            </a:r>
+          </a:p>
+          <a:p>
+            <a:pPr lvl="1">
+              <a:buFont typeface="Wingdings" panose="05000000000000000000" pitchFamily="2" charset="2"/>
+              <a:buChar char="§"/>
+            </a:pPr>
+            <a:r>
+              <a:rPr lang="en-US" dirty="0"/>
+              <a:t>Use the “help” button to get my attention</a:t>
+            </a:r>
+          </a:p>
+          <a:p>
+            <a:pPr lvl="1">
+              <a:buFont typeface="Wingdings" panose="05000000000000000000" pitchFamily="2" charset="2"/>
+              <a:buChar char="§"/>
+            </a:pPr>
+            <a:r>
+              <a:rPr lang="en-US" dirty="0"/>
+              <a:t>You are welcome to take longer or leave early</a:t>
+            </a:r>
+          </a:p>
+          <a:p>
+            <a:pPr>
+              <a:buFont typeface="Wingdings" panose="05000000000000000000" pitchFamily="2" charset="2"/>
+              <a:buChar char="§"/>
+            </a:pPr>
+            <a:r>
+              <a:rPr lang="en-US" dirty="0"/>
+              <a:t> Lab report is due by the start of the next lab (typically a week)</a:t>
+            </a:r>
+          </a:p>
+        </p:txBody>
       </p:sp>
     </p:spTree>
     <p:extLst>
       <p:ext uri="{BB962C8B-B14F-4D97-AF65-F5344CB8AC3E}">
-        <p14:creationId xmlns:p14="http://schemas.microsoft.com/office/powerpoint/2010/main" val="2417191614"/>
+        <p14:creationId xmlns:p14="http://schemas.microsoft.com/office/powerpoint/2010/main" val="1769291969"/>
       </p:ext>
     </p:extLst>
   </p:cSld>
@@ -4818,12 +5221,279 @@
           <a:chExt cx="0" cy="0"/>
         </a:xfrm>
       </p:grpSpPr>
+      <p:sp>
+        <p:nvSpPr>
+          <p:cNvPr id="16" name="Rectangle 15">
+            <a:extLst>
+              <a:ext uri="{FF2B5EF4-FFF2-40B4-BE49-F238E27FC236}">
+                <a16:creationId xmlns:a16="http://schemas.microsoft.com/office/drawing/2014/main" id="{BB2B8762-61F0-4F1B-9364-D633EE9D6AF5}"/>
+              </a:ext>
+              <a:ext uri="{C183D7F6-B498-43B3-948B-1728B52AA6E4}">
+                <adec:decorative xmlns:adec="http://schemas.microsoft.com/office/drawing/2017/decorative" val="1"/>
+              </a:ext>
+            </a:extLst>
+          </p:cNvPr>
+          <p:cNvSpPr>
+            <a:spLocks noGrp="1" noRot="1" noChangeAspect="1" noMove="1" noResize="1" noEditPoints="1" noAdjustHandles="1" noChangeArrowheads="1" noChangeShapeType="1" noTextEdit="1"/>
+          </p:cNvSpPr>
+          <p:nvPr>
+            <p:extLst>
+              <p:ext uri="{386F3935-93C4-4BCD-93E2-E3B085C9AB24}">
+                <p16:designElem xmlns:p16="http://schemas.microsoft.com/office/powerpoint/2015/main" val="1"/>
+              </p:ext>
+            </p:extLst>
+          </p:nvPr>
+        </p:nvSpPr>
+        <p:spPr>
+          <a:xfrm>
+            <a:off x="3175" y="6400800"/>
+            <a:ext cx="12188825" cy="457200"/>
+          </a:xfrm>
+          <a:prstGeom prst="rect">
+            <a:avLst/>
+          </a:prstGeom>
+          <a:solidFill>
+            <a:schemeClr val="accent2"/>
+          </a:solidFill>
+          <a:ln>
+            <a:noFill/>
+          </a:ln>
+        </p:spPr>
+        <p:style>
+          <a:lnRef idx="2">
+            <a:schemeClr val="accent1">
+              <a:shade val="50000"/>
+            </a:schemeClr>
+          </a:lnRef>
+          <a:fillRef idx="1">
+            <a:schemeClr val="accent1"/>
+          </a:fillRef>
+          <a:effectRef idx="0">
+            <a:schemeClr val="accent1"/>
+          </a:effectRef>
+          <a:fontRef idx="minor">
+            <a:schemeClr val="lt1"/>
+          </a:fontRef>
+        </p:style>
+      </p:sp>
+      <p:sp>
+        <p:nvSpPr>
+          <p:cNvPr id="18" name="Rectangle 17">
+            <a:extLst>
+              <a:ext uri="{FF2B5EF4-FFF2-40B4-BE49-F238E27FC236}">
+                <a16:creationId xmlns:a16="http://schemas.microsoft.com/office/drawing/2014/main" id="{E97675C8-1328-460C-9EBF-6B446B67EAD3}"/>
+              </a:ext>
+              <a:ext uri="{C183D7F6-B498-43B3-948B-1728B52AA6E4}">
+                <adec:decorative xmlns:adec="http://schemas.microsoft.com/office/drawing/2017/decorative" val="1"/>
+              </a:ext>
+            </a:extLst>
+          </p:cNvPr>
+          <p:cNvSpPr>
+            <a:spLocks noGrp="1" noRot="1" noChangeAspect="1" noMove="1" noResize="1" noEditPoints="1" noAdjustHandles="1" noChangeArrowheads="1" noChangeShapeType="1" noTextEdit="1"/>
+          </p:cNvSpPr>
+          <p:nvPr>
+            <p:extLst>
+              <p:ext uri="{386F3935-93C4-4BCD-93E2-E3B085C9AB24}">
+                <p16:designElem xmlns:p16="http://schemas.microsoft.com/office/powerpoint/2015/main" val="1"/>
+              </p:ext>
+            </p:extLst>
+          </p:nvPr>
+        </p:nvSpPr>
+        <p:spPr>
+          <a:xfrm>
+            <a:off x="15" y="6334316"/>
+            <a:ext cx="12188825" cy="64008"/>
+          </a:xfrm>
+          <a:prstGeom prst="rect">
+            <a:avLst/>
+          </a:prstGeom>
+          <a:solidFill>
+            <a:schemeClr val="accent1"/>
+          </a:solidFill>
+          <a:ln>
+            <a:noFill/>
+          </a:ln>
+        </p:spPr>
+        <p:style>
+          <a:lnRef idx="2">
+            <a:schemeClr val="accent1">
+              <a:shade val="50000"/>
+            </a:schemeClr>
+          </a:lnRef>
+          <a:fillRef idx="1">
+            <a:schemeClr val="accent1"/>
+          </a:fillRef>
+          <a:effectRef idx="0">
+            <a:schemeClr val="accent1"/>
+          </a:effectRef>
+          <a:fontRef idx="minor">
+            <a:schemeClr val="lt1"/>
+          </a:fontRef>
+        </p:style>
+      </p:sp>
+      <p:cxnSp>
+        <p:nvCxnSpPr>
+          <p:cNvPr id="20" name="Straight Connector 19">
+            <a:extLst>
+              <a:ext uri="{FF2B5EF4-FFF2-40B4-BE49-F238E27FC236}">
+                <a16:creationId xmlns:a16="http://schemas.microsoft.com/office/drawing/2014/main" id="{514EE78B-AF71-4195-A01B-F1165D9233BF}"/>
+              </a:ext>
+              <a:ext uri="{C183D7F6-B498-43B3-948B-1728B52AA6E4}">
+                <adec:decorative xmlns:adec="http://schemas.microsoft.com/office/drawing/2017/decorative" val="1"/>
+              </a:ext>
+            </a:extLst>
+          </p:cNvPr>
+          <p:cNvCxnSpPr>
+            <a:cxnSpLocks noGrp="1" noRot="1" noChangeAspect="1" noMove="1" noResize="1" noEditPoints="1" noAdjustHandles="1" noChangeArrowheads="1" noChangeShapeType="1"/>
+          </p:cNvCxnSpPr>
+          <p:nvPr>
+            <p:extLst>
+              <p:ext uri="{386F3935-93C4-4BCD-93E2-E3B085C9AB24}">
+                <p16:designElem xmlns:p16="http://schemas.microsoft.com/office/powerpoint/2015/main" val="1"/>
+              </p:ext>
+            </p:extLst>
+          </p:nvPr>
+        </p:nvCxnSpPr>
+        <p:spPr>
+          <a:xfrm>
+            <a:off x="1207658" y="4343400"/>
+            <a:ext cx="9875520" cy="0"/>
+          </a:xfrm>
+          <a:prstGeom prst="line">
+            <a:avLst/>
+          </a:prstGeom>
+          <a:ln w="6350">
+            <a:solidFill>
+              <a:schemeClr val="tx1">
+                <a:lumMod val="50000"/>
+                <a:lumOff val="50000"/>
+              </a:schemeClr>
+            </a:solidFill>
+          </a:ln>
+        </p:spPr>
+        <p:style>
+          <a:lnRef idx="1">
+            <a:schemeClr val="accent1"/>
+          </a:lnRef>
+          <a:fillRef idx="0">
+            <a:schemeClr val="accent1"/>
+          </a:fillRef>
+          <a:effectRef idx="0">
+            <a:schemeClr val="accent1"/>
+          </a:effectRef>
+          <a:fontRef idx="minor">
+            <a:schemeClr val="tx1"/>
+          </a:fontRef>
+        </p:style>
+      </p:cxnSp>
+      <p:sp useBgFill="1">
+        <p:nvSpPr>
+          <p:cNvPr id="22" name="Rectangle 21">
+            <a:extLst>
+              <a:ext uri="{FF2B5EF4-FFF2-40B4-BE49-F238E27FC236}">
+                <a16:creationId xmlns:a16="http://schemas.microsoft.com/office/drawing/2014/main" id="{C6417104-D4C1-4710-9982-2154A7F48492}"/>
+              </a:ext>
+              <a:ext uri="{C183D7F6-B498-43B3-948B-1728B52AA6E4}">
+                <adec:decorative xmlns:adec="http://schemas.microsoft.com/office/drawing/2017/decorative" val="1"/>
+              </a:ext>
+            </a:extLst>
+          </p:cNvPr>
+          <p:cNvSpPr>
+            <a:spLocks noGrp="1" noRot="1" noChangeAspect="1" noMove="1" noResize="1" noEditPoints="1" noAdjustHandles="1" noChangeArrowheads="1" noChangeShapeType="1" noTextEdit="1"/>
+          </p:cNvSpPr>
+          <p:nvPr>
+            <p:extLst>
+              <p:ext uri="{386F3935-93C4-4BCD-93E2-E3B085C9AB24}">
+                <p16:designElem xmlns:p16="http://schemas.microsoft.com/office/powerpoint/2015/main" val="1"/>
+              </p:ext>
+            </p:extLst>
+          </p:nvPr>
+        </p:nvSpPr>
+        <p:spPr>
+          <a:xfrm>
+            <a:off x="0" y="0"/>
+            <a:ext cx="12192001" cy="6334316"/>
+          </a:xfrm>
+          <a:prstGeom prst="rect">
+            <a:avLst/>
+          </a:prstGeom>
+          <a:ln>
+            <a:noFill/>
+          </a:ln>
+        </p:spPr>
+        <p:style>
+          <a:lnRef idx="2">
+            <a:schemeClr val="accent1">
+              <a:shade val="50000"/>
+            </a:schemeClr>
+          </a:lnRef>
+          <a:fillRef idx="1">
+            <a:schemeClr val="accent1"/>
+          </a:fillRef>
+          <a:effectRef idx="0">
+            <a:schemeClr val="accent1"/>
+          </a:effectRef>
+          <a:fontRef idx="minor">
+            <a:schemeClr val="lt1"/>
+          </a:fontRef>
+        </p:style>
+        <p:txBody>
+          <a:bodyPr rtlCol="0" anchor="ctr"/>
+          <a:lstStyle/>
+          <a:p>
+            <a:pPr algn="ctr"/>
+            <a:endParaRPr lang="en-US"/>
+          </a:p>
+        </p:txBody>
+      </p:sp>
+      <p:sp>
+        <p:nvSpPr>
+          <p:cNvPr id="2" name="Title 1">
+            <a:extLst>
+              <a:ext uri="{FF2B5EF4-FFF2-40B4-BE49-F238E27FC236}">
+                <a16:creationId xmlns:a16="http://schemas.microsoft.com/office/drawing/2014/main" id="{A1966945-46F7-4819-9BAA-10DC70F3D7BE}"/>
+              </a:ext>
+            </a:extLst>
+          </p:cNvPr>
+          <p:cNvSpPr>
+            <a:spLocks noGrp="1"/>
+          </p:cNvSpPr>
+          <p:nvPr>
+            <p:ph type="title"/>
+          </p:nvPr>
+        </p:nvSpPr>
+        <p:spPr>
+          <a:xfrm>
+            <a:off x="633999" y="4550229"/>
+            <a:ext cx="10909073" cy="1057655"/>
+          </a:xfrm>
+        </p:spPr>
+        <p:txBody>
+          <a:bodyPr vert="horz" lIns="91440" tIns="45720" rIns="91440" bIns="45720" rtlCol="0" anchor="b">
+            <a:normAutofit/>
+          </a:bodyPr>
+          <a:lstStyle/>
+          <a:p>
+            <a:r>
+              <a:rPr lang="en-US" sz="6000" dirty="0">
+                <a:solidFill>
+                  <a:schemeClr val="tx1">
+                    <a:lumMod val="85000"/>
+                    <a:lumOff val="15000"/>
+                  </a:schemeClr>
+                </a:solidFill>
+              </a:rPr>
+              <a:t>Arduino</a:t>
+            </a:r>
+          </a:p>
+        </p:txBody>
+      </p:sp>
       <p:pic>
         <p:nvPicPr>
-          <p:cNvPr id="3" name="Picture 2" descr="A screenshot of a computer&#10;&#10;Description automatically generated">
+          <p:cNvPr id="7" name="Picture 6" descr="A circuit board&#10;&#10;Description automatically generated">
             <a:extLst>
               <a:ext uri="{FF2B5EF4-FFF2-40B4-BE49-F238E27FC236}">
-                <a16:creationId xmlns:a16="http://schemas.microsoft.com/office/drawing/2014/main" id="{B4BC8777-2A92-4C3A-A8EE-CFDC7A76F4F4}"/>
+                <a16:creationId xmlns:a16="http://schemas.microsoft.com/office/drawing/2014/main" id="{C14371A5-8CDD-476A-BA30-1A7C69E92320}"/>
               </a:ext>
             </a:extLst>
           </p:cNvPr>
@@ -4832,15 +5502,16 @@
           </p:cNvPicPr>
           <p:nvPr/>
         </p:nvPicPr>
-        <p:blipFill rotWithShape="1">
+        <p:blipFill>
           <a:blip r:embed="rId2"/>
-          <a:srcRect r="-1" b="17556"/>
-          <a:stretch/>
+          <a:stretch>
+            <a:fillRect/>
+          </a:stretch>
         </p:blipFill>
         <p:spPr>
           <a:xfrm>
-            <a:off x="842772" y="-100584"/>
-            <a:ext cx="10506456" cy="5175504"/>
+            <a:off x="635457" y="1197777"/>
+            <a:ext cx="5131653" cy="2487342"/>
           </a:xfrm>
           <a:prstGeom prst="rect">
             <a:avLst/>
@@ -4849,61 +5520,262 @@
       </p:pic>
       <p:sp>
         <p:nvSpPr>
-          <p:cNvPr id="7" name="Title 6">
+          <p:cNvPr id="24" name="Rectangle 23">
             <a:extLst>
               <a:ext uri="{FF2B5EF4-FFF2-40B4-BE49-F238E27FC236}">
-                <a16:creationId xmlns:a16="http://schemas.microsoft.com/office/drawing/2014/main" id="{22F45388-0B6A-4123-8833-72C0FDC09E00}"/>
+                <a16:creationId xmlns:a16="http://schemas.microsoft.com/office/drawing/2014/main" id="{626F1402-2DEC-4071-84AF-350C7BF00D43}"/>
+              </a:ext>
+              <a:ext uri="{C183D7F6-B498-43B3-948B-1728B52AA6E4}">
+                <adec:decorative xmlns:adec="http://schemas.microsoft.com/office/drawing/2017/decorative" val="1"/>
               </a:ext>
             </a:extLst>
           </p:cNvPr>
           <p:cNvSpPr>
-            <a:spLocks noGrp="1"/>
-          </p:cNvSpPr>
-          <p:nvPr>
-            <p:ph type="title"/>
-          </p:nvPr>
-        </p:nvSpPr>
-        <p:spPr/>
-        <p:txBody>
-          <a:bodyPr/>
+            <a:spLocks noGrp="1" noRot="1" noChangeAspect="1" noMove="1" noResize="1" noEditPoints="1" noAdjustHandles="1" noChangeArrowheads="1" noChangeShapeType="1" noTextEdit="1"/>
+          </p:cNvSpPr>
+          <p:nvPr>
+            <p:extLst>
+              <p:ext uri="{386F3935-93C4-4BCD-93E2-E3B085C9AB24}">
+                <p16:designElem xmlns:p16="http://schemas.microsoft.com/office/powerpoint/2015/main" val="1"/>
+              </p:ext>
+            </p:extLst>
+          </p:nvPr>
+        </p:nvSpPr>
+        <p:spPr>
+          <a:xfrm>
+            <a:off x="6063996" y="886968"/>
+            <a:ext cx="64008" cy="3108960"/>
+          </a:xfrm>
+          <a:prstGeom prst="rect">
+            <a:avLst/>
+          </a:prstGeom>
+          <a:ln>
+            <a:noFill/>
+          </a:ln>
+        </p:spPr>
+        <p:style>
+          <a:lnRef idx="2">
+            <a:schemeClr val="accent1">
+              <a:shade val="50000"/>
+            </a:schemeClr>
+          </a:lnRef>
+          <a:fillRef idx="1">
+            <a:schemeClr val="accent1"/>
+          </a:fillRef>
+          <a:effectRef idx="0">
+            <a:schemeClr val="accent1"/>
+          </a:effectRef>
+          <a:fontRef idx="minor">
+            <a:schemeClr val="lt1"/>
+          </a:fontRef>
+        </p:style>
+        <p:txBody>
+          <a:bodyPr rtlCol="0" anchor="ctr"/>
           <a:lstStyle/>
           <a:p>
-            <a:r>
-              <a:rPr lang="en-US" dirty="0"/>
-              <a:t>UnoArduSim</a:t>
-            </a:r>
-          </a:p>
-        </p:txBody>
-      </p:sp>
-      <p:sp>
-        <p:nvSpPr>
-          <p:cNvPr id="11" name="Text Placeholder 10">
+            <a:pPr algn="ctr"/>
+            <a:endParaRPr lang="en-US"/>
+          </a:p>
+        </p:txBody>
+      </p:sp>
+      <p:pic>
+        <p:nvPicPr>
+          <p:cNvPr id="11" name="Picture 10" descr="A circuit board&#10;&#10;Description automatically generated">
             <a:extLst>
               <a:ext uri="{FF2B5EF4-FFF2-40B4-BE49-F238E27FC236}">
-                <a16:creationId xmlns:a16="http://schemas.microsoft.com/office/drawing/2014/main" id="{B867869C-6E41-4C36-8AE6-D6A6C36E0B87}"/>
+                <a16:creationId xmlns:a16="http://schemas.microsoft.com/office/drawing/2014/main" id="{9F05A8B3-435D-4DE3-912A-AC3D4964937C}"/>
               </a:ext>
             </a:extLst>
           </p:cNvPr>
-          <p:cNvSpPr>
-            <a:spLocks noGrp="1"/>
-          </p:cNvSpPr>
-          <p:nvPr>
-            <p:ph type="body" sz="half" idx="2"/>
-          </p:nvPr>
-        </p:nvSpPr>
-        <p:spPr/>
-        <p:txBody>
-          <a:bodyPr/>
-          <a:lstStyle/>
-          <a:p>
-            <a:endParaRPr lang="en-US"/>
-          </a:p>
-        </p:txBody>
+          <p:cNvPicPr>
+            <a:picLocks noChangeAspect="1"/>
+          </p:cNvPicPr>
+          <p:nvPr/>
+        </p:nvPicPr>
+        <p:blipFill>
+          <a:blip r:embed="rId3"/>
+          <a:stretch>
+            <a:fillRect/>
+          </a:stretch>
+        </p:blipFill>
+        <p:spPr>
+          <a:xfrm>
+            <a:off x="6424891" y="682073"/>
+            <a:ext cx="5118182" cy="3518750"/>
+          </a:xfrm>
+          <a:prstGeom prst="rect">
+            <a:avLst/>
+          </a:prstGeom>
+        </p:spPr>
+      </p:pic>
+      <p:cxnSp>
+        <p:nvCxnSpPr>
+          <p:cNvPr id="26" name="Straight Connector 25">
+            <a:extLst>
+              <a:ext uri="{FF2B5EF4-FFF2-40B4-BE49-F238E27FC236}">
+                <a16:creationId xmlns:a16="http://schemas.microsoft.com/office/drawing/2014/main" id="{04733B62-1719-4677-A612-CA0AC0AD7482}"/>
+              </a:ext>
+              <a:ext uri="{C183D7F6-B498-43B3-948B-1728B52AA6E4}">
+                <adec:decorative xmlns:adec="http://schemas.microsoft.com/office/drawing/2017/decorative" val="1"/>
+              </a:ext>
+            </a:extLst>
+          </p:cNvPr>
+          <p:cNvCxnSpPr>
+            <a:cxnSpLocks noGrp="1" noRot="1" noChangeAspect="1" noMove="1" noResize="1" noEditPoints="1" noAdjustHandles="1" noChangeArrowheads="1" noChangeShapeType="1"/>
+          </p:cNvCxnSpPr>
+          <p:nvPr>
+            <p:extLst>
+              <p:ext uri="{386F3935-93C4-4BCD-93E2-E3B085C9AB24}">
+                <p16:designElem xmlns:p16="http://schemas.microsoft.com/office/powerpoint/2015/main" val="1"/>
+              </p:ext>
+            </p:extLst>
+          </p:nvPr>
+        </p:nvCxnSpPr>
+        <p:spPr>
+          <a:xfrm>
+            <a:off x="721086" y="5618770"/>
+            <a:ext cx="10515600" cy="0"/>
+          </a:xfrm>
+          <a:prstGeom prst="line">
+            <a:avLst/>
+          </a:prstGeom>
+          <a:ln w="6350">
+            <a:solidFill>
+              <a:schemeClr val="tx2">
+                <a:alpha val="90000"/>
+              </a:schemeClr>
+            </a:solidFill>
+          </a:ln>
+        </p:spPr>
+        <p:style>
+          <a:lnRef idx="1">
+            <a:schemeClr val="accent1"/>
+          </a:lnRef>
+          <a:fillRef idx="0">
+            <a:schemeClr val="accent1"/>
+          </a:fillRef>
+          <a:effectRef idx="0">
+            <a:schemeClr val="accent1"/>
+          </a:effectRef>
+          <a:fontRef idx="minor">
+            <a:schemeClr val="tx1"/>
+          </a:fontRef>
+        </p:style>
+      </p:cxnSp>
+      <p:sp>
+        <p:nvSpPr>
+          <p:cNvPr id="28" name="Rectangle 27">
+            <a:extLst>
+              <a:ext uri="{FF2B5EF4-FFF2-40B4-BE49-F238E27FC236}">
+                <a16:creationId xmlns:a16="http://schemas.microsoft.com/office/drawing/2014/main" id="{DA52A394-10F4-4AA5-90E4-634D1E919DBA}"/>
+              </a:ext>
+              <a:ext uri="{C183D7F6-B498-43B3-948B-1728B52AA6E4}">
+                <adec:decorative xmlns:adec="http://schemas.microsoft.com/office/drawing/2017/decorative" val="1"/>
+              </a:ext>
+            </a:extLst>
+          </p:cNvPr>
+          <p:cNvSpPr>
+            <a:spLocks noGrp="1" noRot="1" noChangeAspect="1" noMove="1" noResize="1" noEditPoints="1" noAdjustHandles="1" noChangeArrowheads="1" noChangeShapeType="1" noTextEdit="1"/>
+          </p:cNvSpPr>
+          <p:nvPr>
+            <p:extLst>
+              <p:ext uri="{386F3935-93C4-4BCD-93E2-E3B085C9AB24}">
+                <p16:designElem xmlns:p16="http://schemas.microsoft.com/office/powerpoint/2015/main" val="1"/>
+              </p:ext>
+            </p:extLst>
+          </p:nvPr>
+        </p:nvSpPr>
+        <p:spPr>
+          <a:xfrm>
+            <a:off x="15" y="6334316"/>
+            <a:ext cx="12191985" cy="66484"/>
+          </a:xfrm>
+          <a:prstGeom prst="rect">
+            <a:avLst/>
+          </a:prstGeom>
+          <a:solidFill>
+            <a:schemeClr val="accent1"/>
+          </a:solidFill>
+          <a:ln>
+            <a:noFill/>
+          </a:ln>
+        </p:spPr>
+        <p:style>
+          <a:lnRef idx="2">
+            <a:schemeClr val="accent1">
+              <a:shade val="50000"/>
+            </a:schemeClr>
+          </a:lnRef>
+          <a:fillRef idx="1">
+            <a:schemeClr val="accent1"/>
+          </a:fillRef>
+          <a:effectRef idx="0">
+            <a:schemeClr val="accent1"/>
+          </a:effectRef>
+          <a:fontRef idx="minor">
+            <a:schemeClr val="lt1"/>
+          </a:fontRef>
+        </p:style>
+      </p:sp>
+      <p:sp>
+        <p:nvSpPr>
+          <p:cNvPr id="30" name="Rectangle 29">
+            <a:extLst>
+              <a:ext uri="{FF2B5EF4-FFF2-40B4-BE49-F238E27FC236}">
+                <a16:creationId xmlns:a16="http://schemas.microsoft.com/office/drawing/2014/main" id="{07BDDC51-8BB2-42BE-8EA8-39B3E9AC1EF6}"/>
+              </a:ext>
+              <a:ext uri="{C183D7F6-B498-43B3-948B-1728B52AA6E4}">
+                <adec:decorative xmlns:adec="http://schemas.microsoft.com/office/drawing/2017/decorative" val="1"/>
+              </a:ext>
+            </a:extLst>
+          </p:cNvPr>
+          <p:cNvSpPr>
+            <a:spLocks noGrp="1" noRot="1" noChangeAspect="1" noMove="1" noResize="1" noEditPoints="1" noAdjustHandles="1" noChangeArrowheads="1" noChangeShapeType="1" noTextEdit="1"/>
+          </p:cNvSpPr>
+          <p:nvPr>
+            <p:extLst>
+              <p:ext uri="{386F3935-93C4-4BCD-93E2-E3B085C9AB24}">
+                <p16:designElem xmlns:p16="http://schemas.microsoft.com/office/powerpoint/2015/main" val="1"/>
+              </p:ext>
+            </p:extLst>
+          </p:nvPr>
+        </p:nvSpPr>
+        <p:spPr>
+          <a:xfrm>
+            <a:off x="1" y="6400800"/>
+            <a:ext cx="12192000" cy="457200"/>
+          </a:xfrm>
+          <a:prstGeom prst="rect">
+            <a:avLst/>
+          </a:prstGeom>
+          <a:solidFill>
+            <a:schemeClr val="accent2"/>
+          </a:solidFill>
+          <a:ln>
+            <a:noFill/>
+          </a:ln>
+        </p:spPr>
+        <p:style>
+          <a:lnRef idx="2">
+            <a:schemeClr val="accent1">
+              <a:shade val="50000"/>
+            </a:schemeClr>
+          </a:lnRef>
+          <a:fillRef idx="1">
+            <a:schemeClr val="accent1"/>
+          </a:fillRef>
+          <a:effectRef idx="0">
+            <a:schemeClr val="accent1"/>
+          </a:effectRef>
+          <a:fontRef idx="minor">
+            <a:schemeClr val="lt1"/>
+          </a:fontRef>
+        </p:style>
       </p:sp>
     </p:spTree>
     <p:extLst>
       <p:ext uri="{BB962C8B-B14F-4D97-AF65-F5344CB8AC3E}">
-        <p14:creationId xmlns:p14="http://schemas.microsoft.com/office/powerpoint/2010/main" val="4129873968"/>
+        <p14:creationId xmlns:p14="http://schemas.microsoft.com/office/powerpoint/2010/main" val="2417191614"/>
       </p:ext>
     </p:extLst>
   </p:cSld>
@@ -4916,6 +5788,14 @@
 <file path=ppt/slides/slide6.xml><?xml version="1.0" encoding="utf-8"?>
 <p:sld xmlns:a="http://schemas.openxmlformats.org/drawingml/2006/main" xmlns:r="http://schemas.openxmlformats.org/officeDocument/2006/relationships" xmlns:p="http://schemas.openxmlformats.org/presentationml/2006/main">
   <p:cSld>
+    <p:bg>
+      <p:bgPr>
+        <a:solidFill>
+          <a:schemeClr val="bg1"/>
+        </a:solidFill>
+        <a:effectLst/>
+      </p:bgPr>
+    </p:bg>
     <p:spTree>
       <p:nvGrpSpPr>
         <p:cNvPr id="1" name=""/>
@@ -4932,10 +5812,10 @@
       </p:grpSpPr>
       <p:sp>
         <p:nvSpPr>
-          <p:cNvPr id="2" name="Title 1">
+          <p:cNvPr id="7" name="Title 6">
             <a:extLst>
               <a:ext uri="{FF2B5EF4-FFF2-40B4-BE49-F238E27FC236}">
-                <a16:creationId xmlns:a16="http://schemas.microsoft.com/office/drawing/2014/main" id="{A1966945-46F7-4819-9BAA-10DC70F3D7BE}"/>
+                <a16:creationId xmlns:a16="http://schemas.microsoft.com/office/drawing/2014/main" id="{22F45388-0B6A-4123-8833-72C0FDC09E00}"/>
               </a:ext>
             </a:extLst>
           </p:cNvPr>
@@ -4953,17 +5833,17 @@
           <a:p>
             <a:r>
               <a:rPr lang="en-US" dirty="0"/>
-              <a:t>Lab Report Template</a:t>
-            </a:r>
-          </a:p>
-        </p:txBody>
-      </p:sp>
-      <p:sp>
-        <p:nvSpPr>
-          <p:cNvPr id="3" name="Content Placeholder 2">
+              <a:t>Tinkercad</a:t>
+            </a:r>
+          </a:p>
+        </p:txBody>
+      </p:sp>
+      <p:sp>
+        <p:nvSpPr>
+          <p:cNvPr id="11" name="Text Placeholder 10">
             <a:extLst>
               <a:ext uri="{FF2B5EF4-FFF2-40B4-BE49-F238E27FC236}">
-                <a16:creationId xmlns:a16="http://schemas.microsoft.com/office/drawing/2014/main" id="{1A29CAEF-11FA-41AA-9D72-16A9967E06F5}"/>
+                <a16:creationId xmlns:a16="http://schemas.microsoft.com/office/drawing/2014/main" id="{B867869C-6E41-4C36-8AE6-D6A6C36E0B87}"/>
               </a:ext>
             </a:extLst>
           </p:cNvPr>
@@ -4971,7 +5851,7 @@
             <a:spLocks noGrp="1"/>
           </p:cNvSpPr>
           <p:nvPr>
-            <p:ph sz="half" idx="1"/>
+            <p:ph type="body" sz="half" idx="2"/>
           </p:nvPr>
         </p:nvSpPr>
         <p:spPr/>
@@ -4979,130 +5859,44 @@
           <a:bodyPr/>
           <a:lstStyle/>
           <a:p>
-            <a:pPr>
-              <a:buFont typeface="Wingdings" panose="05000000000000000000" pitchFamily="2" charset="2"/>
-              <a:buChar char="§"/>
-            </a:pPr>
-            <a:r>
-              <a:rPr lang="en-US" dirty="0"/>
-              <a:t> Labs can be written and submitted as a team</a:t>
-            </a:r>
-          </a:p>
-          <a:p>
-            <a:pPr>
-              <a:buFont typeface="Wingdings" panose="05000000000000000000" pitchFamily="2" charset="2"/>
-              <a:buChar char="§"/>
-            </a:pPr>
-            <a:r>
-              <a:rPr lang="en-US" dirty="0"/>
-              <a:t> Submit by email to </a:t>
-            </a:r>
-            <a:r>
-              <a:rPr lang="en-US" dirty="0">
-                <a:hlinkClick r:id="rId2"/>
-              </a:rPr>
-              <a:t>jack.davis001@umb.edu</a:t>
-            </a:r>
-            <a:r>
-              <a:rPr lang="en-US" dirty="0"/>
-              <a:t> before your sections next meeting</a:t>
-            </a:r>
-          </a:p>
-          <a:p>
-            <a:pPr>
-              <a:buFont typeface="Wingdings" panose="05000000000000000000" pitchFamily="2" charset="2"/>
-              <a:buChar char="§"/>
-            </a:pPr>
-            <a:r>
-              <a:rPr lang="en-US" dirty="0"/>
-              <a:t> There will be 10 labs</a:t>
-            </a:r>
-          </a:p>
-          <a:p>
-            <a:pPr>
-              <a:buFont typeface="Wingdings" panose="05000000000000000000" pitchFamily="2" charset="2"/>
-              <a:buChar char="§"/>
-            </a:pPr>
-            <a:r>
-              <a:rPr lang="en-US" dirty="0"/>
-              <a:t> I’ll be grading each lab out of 10:</a:t>
-            </a:r>
-          </a:p>
-          <a:p>
-            <a:pPr lvl="1">
-              <a:buFont typeface="Wingdings" panose="05000000000000000000" pitchFamily="2" charset="2"/>
-              <a:buChar char="§"/>
-            </a:pPr>
-            <a:r>
-              <a:rPr lang="en-US" dirty="0"/>
-              <a:t>5 points for submitting the lab report on time</a:t>
-            </a:r>
-          </a:p>
-          <a:p>
-            <a:pPr lvl="1">
-              <a:buFont typeface="Wingdings" panose="05000000000000000000" pitchFamily="2" charset="2"/>
-              <a:buChar char="§"/>
-            </a:pPr>
-            <a:r>
-              <a:rPr lang="en-US" dirty="0"/>
-              <a:t>3 points for quality of lab report</a:t>
-            </a:r>
-          </a:p>
-          <a:p>
-            <a:pPr lvl="1">
-              <a:buFont typeface="Wingdings" panose="05000000000000000000" pitchFamily="2" charset="2"/>
-              <a:buChar char="§"/>
-            </a:pPr>
-            <a:r>
-              <a:rPr lang="en-US" dirty="0"/>
-              <a:t>2 points for code that works correctly</a:t>
-            </a:r>
-          </a:p>
-          <a:p>
-            <a:pPr>
-              <a:buFont typeface="Wingdings" panose="05000000000000000000" pitchFamily="2" charset="2"/>
-              <a:buChar char="§"/>
-            </a:pPr>
-            <a:r>
-              <a:rPr lang="en-US" dirty="0"/>
-              <a:t> If you can’t get your code working in time, please document what you tried and submit the lab anyway</a:t>
-            </a:r>
+            <a:endParaRPr lang="en-US"/>
           </a:p>
         </p:txBody>
       </p:sp>
       <p:pic>
         <p:nvPicPr>
-          <p:cNvPr id="8" name="Content Placeholder 7" descr="A screenshot of a cell phone&#10;&#10;Description automatically generated">
+          <p:cNvPr id="4" name="Picture 3" descr="A screenshot of a computer&#10;&#10;Description automatically generated">
             <a:extLst>
               <a:ext uri="{FF2B5EF4-FFF2-40B4-BE49-F238E27FC236}">
-                <a16:creationId xmlns:a16="http://schemas.microsoft.com/office/drawing/2014/main" id="{4A1D8235-7DEB-41F5-AF3C-FF2AADCC5891}"/>
+                <a16:creationId xmlns:a16="http://schemas.microsoft.com/office/drawing/2014/main" id="{BC53B577-1D3D-4D86-896F-8E4F21C595EB}"/>
               </a:ext>
             </a:extLst>
           </p:cNvPr>
           <p:cNvPicPr>
-            <a:picLocks noGrp="1" noChangeAspect="1"/>
+            <a:picLocks noChangeAspect="1"/>
           </p:cNvPicPr>
-          <p:nvPr>
-            <p:ph sz="half" idx="2"/>
-          </p:nvPr>
+          <p:nvPr/>
         </p:nvPicPr>
         <p:blipFill>
-          <a:blip r:embed="rId3"/>
+          <a:blip r:embed="rId2"/>
           <a:stretch>
             <a:fillRect/>
           </a:stretch>
         </p:blipFill>
         <p:spPr>
           <a:xfrm>
-            <a:off x="6467860" y="1846263"/>
-            <a:ext cx="4437881" cy="4022725"/>
-          </a:xfrm>
+            <a:off x="1863266" y="196318"/>
+            <a:ext cx="8465468" cy="5089359"/>
+          </a:xfrm>
+          <a:prstGeom prst="rect">
+            <a:avLst/>
+          </a:prstGeom>
         </p:spPr>
       </p:pic>
     </p:spTree>
     <p:extLst>
       <p:ext uri="{BB962C8B-B14F-4D97-AF65-F5344CB8AC3E}">
-        <p14:creationId xmlns:p14="http://schemas.microsoft.com/office/powerpoint/2010/main" val="948530621"/>
+        <p14:creationId xmlns:p14="http://schemas.microsoft.com/office/powerpoint/2010/main" val="4129873968"/>
       </p:ext>
     </p:extLst>
   </p:cSld>
@@ -5139,10 +5933,10 @@
       </p:grpSpPr>
       <p:sp>
         <p:nvSpPr>
-          <p:cNvPr id="12" name="Rectangle 11">
+          <p:cNvPr id="15" name="Rectangle 14">
             <a:extLst>
               <a:ext uri="{FF2B5EF4-FFF2-40B4-BE49-F238E27FC236}">
-                <a16:creationId xmlns:a16="http://schemas.microsoft.com/office/drawing/2014/main" id="{4E4490D0-3672-446A-AC12-B4830333BDDD}"/>
+                <a16:creationId xmlns:a16="http://schemas.microsoft.com/office/drawing/2014/main" id="{7D379150-F6B4-45C8-BE10-6B278AD400EB}"/>
               </a:ext>
               <a:ext uri="{C183D7F6-B498-43B3-948B-1728B52AA6E4}">
                 <adec:decorative xmlns:adec="http://schemas.microsoft.com/office/drawing/2017/decorative" val="1"/>
@@ -5162,8 +5956,8 @@
         </p:nvSpPr>
         <p:spPr>
           <a:xfrm>
-            <a:off x="3175" y="6400800"/>
-            <a:ext cx="12188825" cy="457200"/>
+            <a:off x="1" y="6400800"/>
+            <a:ext cx="12192000" cy="457200"/>
           </a:xfrm>
           <a:prstGeom prst="rect">
             <a:avLst/>
@@ -5194,10 +5988,10 @@
       </p:sp>
       <p:sp>
         <p:nvSpPr>
-          <p:cNvPr id="14" name="Rectangle 13">
+          <p:cNvPr id="17" name="Rectangle 16">
             <a:extLst>
               <a:ext uri="{FF2B5EF4-FFF2-40B4-BE49-F238E27FC236}">
-                <a16:creationId xmlns:a16="http://schemas.microsoft.com/office/drawing/2014/main" id="{39CB82C2-DF65-4EC1-8280-F201D50F570B}"/>
+                <a16:creationId xmlns:a16="http://schemas.microsoft.com/office/drawing/2014/main" id="{5FFCF544-A370-4A5D-A95F-CA6E0E7191E6}"/>
               </a:ext>
               <a:ext uri="{C183D7F6-B498-43B3-948B-1728B52AA6E4}">
                 <adec:decorative xmlns:adec="http://schemas.microsoft.com/office/drawing/2017/decorative" val="1"/>
@@ -5217,8 +6011,8 @@
         </p:nvSpPr>
         <p:spPr>
           <a:xfrm>
-            <a:off x="15" y="6334316"/>
-            <a:ext cx="12188825" cy="64008"/>
+            <a:off x="0" y="6334316"/>
+            <a:ext cx="12192001" cy="65998"/>
           </a:xfrm>
           <a:prstGeom prst="rect">
             <a:avLst/>
@@ -5249,10 +6043,10 @@
       </p:sp>
       <p:cxnSp>
         <p:nvCxnSpPr>
-          <p:cNvPr id="16" name="Straight Connector 15">
+          <p:cNvPr id="19" name="Straight Connector 18">
             <a:extLst>
               <a:ext uri="{FF2B5EF4-FFF2-40B4-BE49-F238E27FC236}">
-                <a16:creationId xmlns:a16="http://schemas.microsoft.com/office/drawing/2014/main" id="{7E1D4427-852B-4B37-8E76-0E9F1810BA2A}"/>
+                <a16:creationId xmlns:a16="http://schemas.microsoft.com/office/drawing/2014/main" id="{6EEB3B97-A638-498B-8083-54191CE71E01}"/>
               </a:ext>
               <a:ext uri="{C183D7F6-B498-43B3-948B-1728B52AA6E4}">
                 <adec:decorative xmlns:adec="http://schemas.microsoft.com/office/drawing/2017/decorative" val="1"/>
@@ -5272,8 +6066,8 @@
         </p:nvCxnSpPr>
         <p:spPr>
           <a:xfrm>
-            <a:off x="1207658" y="4343400"/>
-            <a:ext cx="9875520" cy="0"/>
+            <a:off x="1193532" y="1737845"/>
+            <a:ext cx="9966960" cy="0"/>
           </a:xfrm>
           <a:prstGeom prst="line">
             <a:avLst/>
@@ -5304,10 +6098,10 @@
       </p:cxnSp>
       <p:sp useBgFill="1">
         <p:nvSpPr>
-          <p:cNvPr id="18" name="Rectangle 17">
+          <p:cNvPr id="28" name="Rectangle 20">
             <a:extLst>
               <a:ext uri="{FF2B5EF4-FFF2-40B4-BE49-F238E27FC236}">
-                <a16:creationId xmlns:a16="http://schemas.microsoft.com/office/drawing/2014/main" id="{FA4CD5CB-D209-4D70-8CA4-629731C59219}"/>
+                <a16:creationId xmlns:a16="http://schemas.microsoft.com/office/drawing/2014/main" id="{52ABB703-2B0E-4C3B-B4A2-F3973548E561}"/>
               </a:ext>
               <a:ext uri="{C183D7F6-B498-43B3-948B-1728B52AA6E4}">
                 <adec:decorative xmlns:adec="http://schemas.microsoft.com/office/drawing/2017/decorative" val="1"/>
@@ -5380,8 +6174,8 @@
         </p:nvSpPr>
         <p:spPr>
           <a:xfrm>
-            <a:off x="8141110" y="639097"/>
-            <a:ext cx="3401961" cy="3686015"/>
+            <a:off x="6411685" y="634946"/>
+            <a:ext cx="5127171" cy="1450757"/>
           </a:xfrm>
         </p:spPr>
         <p:txBody>
@@ -5391,25 +6185,19 @@
           <a:lstStyle/>
           <a:p>
             <a:r>
-              <a:rPr lang="en-US" sz="6600">
-                <a:solidFill>
-                  <a:schemeClr val="tx1">
-                    <a:lumMod val="85000"/>
-                    <a:lumOff val="15000"/>
-                  </a:schemeClr>
-                </a:solidFill>
-              </a:rPr>
-              <a:t>Example Lab Report</a:t>
-            </a:r>
+              <a:rPr lang="en-US"/>
+              <a:t>Lab Report Template</a:t>
+            </a:r>
+            <a:endParaRPr lang="en-US" dirty="0"/>
           </a:p>
         </p:txBody>
       </p:sp>
       <p:pic>
         <p:nvPicPr>
-          <p:cNvPr id="7" name="Content Placeholder 6" descr="A screenshot of a cell phone&#10;&#10;Description automatically generated">
+          <p:cNvPr id="10" name="Content Placeholder 9" descr="A screenshot of a cell phone&#10;&#10;Description automatically generated">
             <a:extLst>
               <a:ext uri="{FF2B5EF4-FFF2-40B4-BE49-F238E27FC236}">
-                <a16:creationId xmlns:a16="http://schemas.microsoft.com/office/drawing/2014/main" id="{B4BC3ECE-4BE3-44AC-B02C-12D640168450}"/>
+                <a16:creationId xmlns:a16="http://schemas.microsoft.com/office/drawing/2014/main" id="{E255FF78-5748-46B2-B9D5-EFEB59F572E9}"/>
               </a:ext>
             </a:extLst>
           </p:cNvPr>
@@ -5417,7 +6205,7 @@
             <a:picLocks noGrp="1" noChangeAspect="1"/>
           </p:cNvPicPr>
           <p:nvPr>
-            <p:ph idx="1"/>
+            <p:ph sz="half" idx="2"/>
           </p:nvPr>
         </p:nvPicPr>
         <p:blipFill>
@@ -5428,8 +6216,8 @@
         </p:blipFill>
         <p:spPr>
           <a:xfrm>
-            <a:off x="1702019" y="640081"/>
-            <a:ext cx="4776177" cy="5054156"/>
+            <a:off x="670935" y="645106"/>
+            <a:ext cx="5396141" cy="5247747"/>
           </a:xfrm>
           <a:prstGeom prst="rect">
             <a:avLst/>
@@ -5438,10 +6226,10 @@
       </p:pic>
       <p:cxnSp>
         <p:nvCxnSpPr>
-          <p:cNvPr id="20" name="Straight Connector 19">
+          <p:cNvPr id="29" name="Straight Connector 22">
             <a:extLst>
               <a:ext uri="{FF2B5EF4-FFF2-40B4-BE49-F238E27FC236}">
-                <a16:creationId xmlns:a16="http://schemas.microsoft.com/office/drawing/2014/main" id="{5C6A2BAE-B461-4B55-8E1F-0722ABDD1393}"/>
+                <a16:creationId xmlns:a16="http://schemas.microsoft.com/office/drawing/2014/main" id="{9C21570E-E159-49A6-9891-FA397B7A92D3}"/>
               </a:ext>
               <a:ext uri="{C183D7F6-B498-43B3-948B-1728B52AA6E4}">
                 <adec:decorative xmlns:adec="http://schemas.microsoft.com/office/drawing/2017/decorative" val="1"/>
@@ -5461,15 +6249,17 @@
         </p:nvCxnSpPr>
         <p:spPr>
           <a:xfrm>
-            <a:off x="8209305" y="4343400"/>
-            <a:ext cx="3200400" cy="0"/>
+            <a:off x="6411684" y="2086188"/>
+            <a:ext cx="4748808" cy="0"/>
           </a:xfrm>
           <a:prstGeom prst="line">
             <a:avLst/>
           </a:prstGeom>
           <a:ln w="6350">
             <a:solidFill>
-              <a:schemeClr val="tx2">
+              <a:schemeClr val="tx1">
+                <a:lumMod val="50000"/>
+                <a:lumOff val="50000"/>
                 <a:alpha val="90000"/>
               </a:schemeClr>
             </a:solidFill>
@@ -5492,10 +6282,129 @@
       </p:cxnSp>
       <p:sp>
         <p:nvSpPr>
-          <p:cNvPr id="22" name="Rectangle 21">
+          <p:cNvPr id="3" name="Content Placeholder 2">
             <a:extLst>
               <a:ext uri="{FF2B5EF4-FFF2-40B4-BE49-F238E27FC236}">
-                <a16:creationId xmlns:a16="http://schemas.microsoft.com/office/drawing/2014/main" id="{B4C27B90-DF2B-4D00-BA07-18ED774CD2F1}"/>
+                <a16:creationId xmlns:a16="http://schemas.microsoft.com/office/drawing/2014/main" id="{1A29CAEF-11FA-41AA-9D72-16A9967E06F5}"/>
+              </a:ext>
+            </a:extLst>
+          </p:cNvPr>
+          <p:cNvSpPr>
+            <a:spLocks noGrp="1"/>
+          </p:cNvSpPr>
+          <p:nvPr>
+            <p:ph sz="half" idx="1"/>
+          </p:nvPr>
+        </p:nvSpPr>
+        <p:spPr>
+          <a:xfrm>
+            <a:off x="6411684" y="2198914"/>
+            <a:ext cx="5127172" cy="3670180"/>
+          </a:xfrm>
+        </p:spPr>
+        <p:txBody>
+          <a:bodyPr vert="horz" lIns="0" tIns="45720" rIns="0" bIns="45720" rtlCol="0">
+            <a:normAutofit/>
+          </a:bodyPr>
+          <a:lstStyle/>
+          <a:p>
+            <a:pPr>
+              <a:buFont typeface="Wingdings" panose="05000000000000000000" pitchFamily="2" charset="2"/>
+              <a:buChar char="§"/>
+            </a:pPr>
+            <a:r>
+              <a:rPr lang="en-US" sz="1500" dirty="0"/>
+              <a:t> Labs can be written and submitted as a team</a:t>
+            </a:r>
+          </a:p>
+          <a:p>
+            <a:pPr>
+              <a:buFont typeface="Wingdings" panose="05000000000000000000" pitchFamily="2" charset="2"/>
+              <a:buChar char="§"/>
+            </a:pPr>
+            <a:r>
+              <a:rPr lang="en-US" sz="1500" dirty="0"/>
+              <a:t> Submit by email to </a:t>
+            </a:r>
+            <a:r>
+              <a:rPr lang="en-US" sz="1500" dirty="0">
+                <a:hlinkClick r:id="rId3"/>
+              </a:rPr>
+              <a:t>jack.davis001@umb.edu</a:t>
+            </a:r>
+            <a:r>
+              <a:rPr lang="en-US" sz="1500" dirty="0"/>
+              <a:t> before your sections next meeting</a:t>
+            </a:r>
+          </a:p>
+          <a:p>
+            <a:pPr>
+              <a:buFont typeface="Wingdings" panose="05000000000000000000" pitchFamily="2" charset="2"/>
+              <a:buChar char="§"/>
+            </a:pPr>
+            <a:r>
+              <a:rPr lang="en-US" sz="1500" dirty="0"/>
+              <a:t> There will be 10 labs</a:t>
+            </a:r>
+          </a:p>
+          <a:p>
+            <a:pPr>
+              <a:buFont typeface="Wingdings" panose="05000000000000000000" pitchFamily="2" charset="2"/>
+              <a:buChar char="§"/>
+            </a:pPr>
+            <a:r>
+              <a:rPr lang="en-US" sz="1500" dirty="0"/>
+              <a:t> I’ll be grading each lab out of 10:</a:t>
+            </a:r>
+          </a:p>
+          <a:p>
+            <a:pPr lvl="1">
+              <a:buFont typeface="Wingdings" panose="05000000000000000000" pitchFamily="2" charset="2"/>
+              <a:buChar char="§"/>
+            </a:pPr>
+            <a:r>
+              <a:rPr lang="en-US" sz="1500" dirty="0"/>
+              <a:t>3 points for submitting the lab report on time</a:t>
+            </a:r>
+          </a:p>
+          <a:p>
+            <a:pPr lvl="1">
+              <a:buFont typeface="Wingdings" panose="05000000000000000000" pitchFamily="2" charset="2"/>
+              <a:buChar char="§"/>
+            </a:pPr>
+            <a:r>
+              <a:rPr lang="en-US" sz="1500" dirty="0"/>
+              <a:t>4 points for quality of lab report</a:t>
+            </a:r>
+          </a:p>
+          <a:p>
+            <a:pPr lvl="1">
+              <a:buFont typeface="Wingdings" panose="05000000000000000000" pitchFamily="2" charset="2"/>
+              <a:buChar char="§"/>
+            </a:pPr>
+            <a:r>
+              <a:rPr lang="en-US" sz="1500" dirty="0"/>
+              <a:t>3 points for code that works correctly</a:t>
+            </a:r>
+          </a:p>
+          <a:p>
+            <a:pPr>
+              <a:buFont typeface="Wingdings" panose="05000000000000000000" pitchFamily="2" charset="2"/>
+              <a:buChar char="§"/>
+            </a:pPr>
+            <a:r>
+              <a:rPr lang="en-US" sz="1500" dirty="0"/>
+              <a:t> If you can’t get your code working in time, please document what you tried and submit the lab anyway</a:t>
+            </a:r>
+          </a:p>
+        </p:txBody>
+      </p:sp>
+      <p:sp>
+        <p:nvSpPr>
+          <p:cNvPr id="30" name="Rectangle 24">
+            <a:extLst>
+              <a:ext uri="{FF2B5EF4-FFF2-40B4-BE49-F238E27FC236}">
+                <a16:creationId xmlns:a16="http://schemas.microsoft.com/office/drawing/2014/main" id="{E95DA498-D9A2-4DA9-B9DA-B3776E08CF7E}"/>
               </a:ext>
               <a:ext uri="{C183D7F6-B498-43B3-948B-1728B52AA6E4}">
                 <adec:decorative xmlns:adec="http://schemas.microsoft.com/office/drawing/2017/decorative" val="1"/>
@@ -5547,10 +6456,10 @@
       </p:sp>
       <p:sp>
         <p:nvSpPr>
-          <p:cNvPr id="24" name="Rectangle 23">
+          <p:cNvPr id="27" name="Rectangle 26">
             <a:extLst>
               <a:ext uri="{FF2B5EF4-FFF2-40B4-BE49-F238E27FC236}">
-                <a16:creationId xmlns:a16="http://schemas.microsoft.com/office/drawing/2014/main" id="{593ACC25-C262-417A-8AA9-0641C772BDB6}"/>
+                <a16:creationId xmlns:a16="http://schemas.microsoft.com/office/drawing/2014/main" id="{82A73093-4B9D-420D-B17E-52293703A1D4}"/>
               </a:ext>
               <a:ext uri="{C183D7F6-B498-43B3-948B-1728B52AA6E4}">
                 <adec:decorative xmlns:adec="http://schemas.microsoft.com/office/drawing/2017/decorative" val="1"/>
@@ -5603,7 +6512,7 @@
     </p:spTree>
     <p:extLst>
       <p:ext uri="{BB962C8B-B14F-4D97-AF65-F5344CB8AC3E}">
-        <p14:creationId xmlns:p14="http://schemas.microsoft.com/office/powerpoint/2010/main" val="1247146300"/>
+        <p14:creationId xmlns:p14="http://schemas.microsoft.com/office/powerpoint/2010/main" val="948530621"/>
       </p:ext>
     </p:extLst>
   </p:cSld>
@@ -5616,6 +6525,14 @@
 <file path=ppt/slides/slide8.xml><?xml version="1.0" encoding="utf-8"?>
 <p:sld xmlns:a="http://schemas.openxmlformats.org/drawingml/2006/main" xmlns:r="http://schemas.openxmlformats.org/officeDocument/2006/relationships" xmlns:p="http://schemas.openxmlformats.org/presentationml/2006/main">
   <p:cSld>
+    <p:bg>
+      <p:bgPr>
+        <a:solidFill>
+          <a:schemeClr val="bg1"/>
+        </a:solidFill>
+        <a:effectLst/>
+      </p:bgPr>
+    </p:bg>
     <p:spTree>
       <p:nvGrpSpPr>
         <p:cNvPr id="1" name=""/>
@@ -5648,91 +6565,87 @@
         </p:nvSpPr>
         <p:spPr/>
         <p:txBody>
-          <a:bodyPr/>
+          <a:bodyPr vert="horz" lIns="91440" tIns="45720" rIns="91440" bIns="45720" rtlCol="0" anchor="b">
+            <a:normAutofit/>
+          </a:bodyPr>
           <a:lstStyle/>
           <a:p>
             <a:r>
-              <a:rPr lang="en-US" dirty="0"/>
-              <a:t>Policies</a:t>
-            </a:r>
-          </a:p>
-        </p:txBody>
-      </p:sp>
-      <p:sp>
-        <p:nvSpPr>
-          <p:cNvPr id="3" name="Content Placeholder 2">
+              <a:rPr lang="en-US" sz="6600">
+                <a:solidFill>
+                  <a:schemeClr val="tx1">
+                    <a:lumMod val="85000"/>
+                    <a:lumOff val="15000"/>
+                  </a:schemeClr>
+                </a:solidFill>
+              </a:rPr>
+              <a:t>Example Lab Report</a:t>
+            </a:r>
+          </a:p>
+        </p:txBody>
+      </p:sp>
+      <p:pic>
+        <p:nvPicPr>
+          <p:cNvPr id="13" name="Content Placeholder 12" descr="A screenshot of a cell phone&#10;&#10;Description automatically generated">
             <a:extLst>
               <a:ext uri="{FF2B5EF4-FFF2-40B4-BE49-F238E27FC236}">
-                <a16:creationId xmlns:a16="http://schemas.microsoft.com/office/drawing/2014/main" id="{1A29CAEF-11FA-41AA-9D72-16A9967E06F5}"/>
+                <a16:creationId xmlns:a16="http://schemas.microsoft.com/office/drawing/2014/main" id="{D51BD24B-3031-4586-9341-7536080F6F41}"/>
               </a:ext>
             </a:extLst>
           </p:cNvPr>
-          <p:cNvSpPr>
-            <a:spLocks noGrp="1"/>
-          </p:cNvSpPr>
-          <p:nvPr>
-            <p:ph idx="1"/>
-          </p:nvPr>
-        </p:nvSpPr>
-        <p:spPr/>
-        <p:txBody>
-          <a:bodyPr/>
-          <a:lstStyle/>
-          <a:p>
-            <a:pPr>
-              <a:buFont typeface="Wingdings" panose="05000000000000000000" pitchFamily="2" charset="2"/>
-              <a:buChar char="§"/>
-            </a:pPr>
-            <a:r>
-              <a:rPr lang="en-US" dirty="0"/>
-              <a:t> Work in groups of 1 or 2</a:t>
-            </a:r>
-          </a:p>
-          <a:p>
-            <a:pPr>
-              <a:buFont typeface="Wingdings" panose="05000000000000000000" pitchFamily="2" charset="2"/>
-              <a:buChar char="§"/>
-            </a:pPr>
-            <a:r>
-              <a:rPr lang="en-US" dirty="0"/>
-              <a:t> Post lab questions on Piazza with lab tag (privately if you need to share code) </a:t>
-            </a:r>
-            <a:endParaRPr lang="en-US" b="1" dirty="0"/>
-          </a:p>
-          <a:p>
-            <a:pPr>
-              <a:buFont typeface="Wingdings" panose="05000000000000000000" pitchFamily="2" charset="2"/>
-              <a:buChar char="§"/>
-            </a:pPr>
-            <a:r>
-              <a:rPr lang="en-US" dirty="0"/>
-              <a:t> makeup labs are allowed (due by 11:59PM on December 11</a:t>
-            </a:r>
-            <a:r>
-              <a:rPr lang="en-US" baseline="30000" dirty="0"/>
-              <a:t>th</a:t>
-            </a:r>
-            <a:r>
-              <a:rPr lang="en-US" dirty="0"/>
-              <a:t>)</a:t>
-            </a:r>
-          </a:p>
-          <a:p>
-            <a:pPr>
-              <a:buFont typeface="Wingdings" panose="05000000000000000000" pitchFamily="2" charset="2"/>
-              <a:buChar char="§"/>
-            </a:pPr>
-            <a:r>
-              <a:rPr lang="en-US" dirty="0"/>
-              <a:t> You may attend a different lab section if you need to</a:t>
-            </a:r>
-          </a:p>
-        </p:txBody>
-      </p:sp>
+          <p:cNvPicPr>
+            <a:picLocks noGrp="1" noChangeAspect="1"/>
+          </p:cNvPicPr>
+          <p:nvPr>
+            <p:ph sz="half" idx="1"/>
+          </p:nvPr>
+        </p:nvPicPr>
+        <p:blipFill>
+          <a:blip r:embed="rId2"/>
+          <a:stretch>
+            <a:fillRect/>
+          </a:stretch>
+        </p:blipFill>
+        <p:spPr>
+          <a:xfrm>
+            <a:off x="1357013" y="1897757"/>
+            <a:ext cx="4738988" cy="4203941"/>
+          </a:xfrm>
+        </p:spPr>
+      </p:pic>
+      <p:pic>
+        <p:nvPicPr>
+          <p:cNvPr id="25" name="Content Placeholder 24" descr="A screenshot of a cell phone&#10;&#10;Description automatically generated">
+            <a:extLst>
+              <a:ext uri="{FF2B5EF4-FFF2-40B4-BE49-F238E27FC236}">
+                <a16:creationId xmlns:a16="http://schemas.microsoft.com/office/drawing/2014/main" id="{15A0E2DF-34B0-4C56-9703-B9D790125203}"/>
+              </a:ext>
+            </a:extLst>
+          </p:cNvPr>
+          <p:cNvPicPr>
+            <a:picLocks noGrp="1" noChangeAspect="1"/>
+          </p:cNvPicPr>
+          <p:nvPr>
+            <p:ph sz="half" idx="2"/>
+          </p:nvPr>
+        </p:nvPicPr>
+        <p:blipFill>
+          <a:blip r:embed="rId3"/>
+          <a:stretch>
+            <a:fillRect/>
+          </a:stretch>
+        </p:blipFill>
+        <p:spPr>
+          <a:xfrm>
+            <a:off x="6096000" y="2493478"/>
+            <a:ext cx="5256115" cy="3012498"/>
+          </a:xfrm>
+        </p:spPr>
+      </p:pic>
     </p:spTree>
     <p:extLst>
       <p:ext uri="{BB962C8B-B14F-4D97-AF65-F5344CB8AC3E}">
-        <p14:creationId xmlns:p14="http://schemas.microsoft.com/office/powerpoint/2010/main" val="1605370376"/>
+        <p14:creationId xmlns:p14="http://schemas.microsoft.com/office/powerpoint/2010/main" val="1247146300"/>
       </p:ext>
     </p:extLst>
   </p:cSld>
@@ -5782,7 +6695,7 @@
           <a:p>
             <a:r>
               <a:rPr lang="en-US" dirty="0"/>
-              <a:t>Lab 1 – Setting up UnoArduSim</a:t>
+              <a:t>Background Information - LED</a:t>
             </a:r>
           </a:p>
         </p:txBody>
@@ -5800,7 +6713,7 @@
             <a:spLocks noGrp="1"/>
           </p:cNvSpPr>
           <p:nvPr>
-            <p:ph idx="1"/>
+            <p:ph sz="half" idx="1"/>
           </p:nvPr>
         </p:nvSpPr>
         <p:spPr/>
@@ -5814,17 +6727,7 @@
             </a:pPr>
             <a:r>
               <a:rPr lang="en-US" dirty="0"/>
-              <a:t> users of Mac/Linux will need to set up a windows VM to use UnoArduSim</a:t>
-            </a:r>
-          </a:p>
-          <a:p>
-            <a:pPr lvl="1">
-              <a:buFont typeface="Wingdings" panose="05000000000000000000" pitchFamily="2" charset="2"/>
-              <a:buChar char="§"/>
-            </a:pPr>
-            <a:r>
-              <a:rPr lang="en-US" dirty="0"/>
-              <a:t>Instructions provided in lab 1 instructions</a:t>
+              <a:t> Light-emitting Diode (LED)</a:t>
             </a:r>
           </a:p>
           <a:p>
@@ -5834,7 +6737,7 @@
             </a:pPr>
             <a:r>
               <a:rPr lang="en-US" dirty="0"/>
-              <a:t> users of Windows 10 can use natively without issue</a:t>
+              <a:t> Power must flow anode (longer lead, round) to cathode or positive to negative</a:t>
             </a:r>
           </a:p>
           <a:p>
@@ -5844,11 +6747,40 @@
             </a:pPr>
             <a:r>
               <a:rPr lang="en-US" dirty="0"/>
-              <a:t> </a:t>
-            </a:r>
-          </a:p>
-        </p:txBody>
-      </p:sp>
+              <a:t> a change in the amount of electricity flowing results in a change in brightness</a:t>
+            </a:r>
+          </a:p>
+        </p:txBody>
+      </p:sp>
+      <p:pic>
+        <p:nvPicPr>
+          <p:cNvPr id="10" name="Content Placeholder 9" descr="A screenshot of a cell phone&#10;&#10;Description automatically generated">
+            <a:extLst>
+              <a:ext uri="{FF2B5EF4-FFF2-40B4-BE49-F238E27FC236}">
+                <a16:creationId xmlns:a16="http://schemas.microsoft.com/office/drawing/2014/main" id="{8E4CBF47-ED8E-48AD-8EBB-663DF0863D38}"/>
+              </a:ext>
+            </a:extLst>
+          </p:cNvPr>
+          <p:cNvPicPr>
+            <a:picLocks noGrp="1" noChangeAspect="1"/>
+          </p:cNvPicPr>
+          <p:nvPr>
+            <p:ph sz="half" idx="2"/>
+          </p:nvPr>
+        </p:nvPicPr>
+        <p:blipFill>
+          <a:blip r:embed="rId2"/>
+          <a:stretch>
+            <a:fillRect/>
+          </a:stretch>
+        </p:blipFill>
+        <p:spPr>
+          <a:xfrm>
+            <a:off x="6218238" y="1929275"/>
+            <a:ext cx="4937125" cy="3856701"/>
+          </a:xfrm>
+        </p:spPr>
+      </p:pic>
     </p:spTree>
     <p:extLst>
       <p:ext uri="{BB962C8B-B14F-4D97-AF65-F5344CB8AC3E}">

</xml_diff>

<commit_message>
minor text changes after section 1
</commit_message>
<xml_diff>
--- a/Lab 1/CS 341 Lab introduction.pptx
+++ b/Lab 1/CS 341 Lab introduction.pptx
@@ -348,7 +348,7 @@
           <a:p>
             <a:fld id="{48A87A34-81AB-432B-8DAE-1953F412C126}" type="datetimeFigureOut">
               <a:rPr lang="en-US" smtClean="0"/>
-              <a:t>9/20/2020</a:t>
+              <a:t>9/22/2020</a:t>
             </a:fld>
             <a:endParaRPr lang="en-US" dirty="0"/>
           </a:p>
@@ -556,7 +556,7 @@
           <a:p>
             <a:fld id="{48A87A34-81AB-432B-8DAE-1953F412C126}" type="datetimeFigureOut">
               <a:rPr lang="en-US" smtClean="0"/>
-              <a:t>9/20/2020</a:t>
+              <a:t>9/22/2020</a:t>
             </a:fld>
             <a:endParaRPr lang="en-US" dirty="0"/>
           </a:p>
@@ -812,7 +812,7 @@
           <a:p>
             <a:fld id="{48A87A34-81AB-432B-8DAE-1953F412C126}" type="datetimeFigureOut">
               <a:rPr lang="en-US" smtClean="0"/>
-              <a:t>9/20/2020</a:t>
+              <a:t>9/22/2020</a:t>
             </a:fld>
             <a:endParaRPr lang="en-US" dirty="0"/>
           </a:p>
@@ -986,7 +986,7 @@
           <a:p>
             <a:fld id="{48A87A34-81AB-432B-8DAE-1953F412C126}" type="datetimeFigureOut">
               <a:rPr lang="en-US" smtClean="0"/>
-              <a:t>9/20/2020</a:t>
+              <a:t>9/22/2020</a:t>
             </a:fld>
             <a:endParaRPr lang="en-US" dirty="0"/>
           </a:p>
@@ -1329,7 +1329,7 @@
           <a:p>
             <a:fld id="{48A87A34-81AB-432B-8DAE-1953F412C126}" type="datetimeFigureOut">
               <a:rPr lang="en-US" smtClean="0"/>
-              <a:t>9/20/2020</a:t>
+              <a:t>9/22/2020</a:t>
             </a:fld>
             <a:endParaRPr lang="en-US" dirty="0"/>
           </a:p>
@@ -1604,7 +1604,7 @@
           <a:p>
             <a:fld id="{48A87A34-81AB-432B-8DAE-1953F412C126}" type="datetimeFigureOut">
               <a:rPr lang="en-US" smtClean="0"/>
-              <a:t>9/20/2020</a:t>
+              <a:t>9/22/2020</a:t>
             </a:fld>
             <a:endParaRPr lang="en-US" dirty="0"/>
           </a:p>
@@ -1983,7 +1983,7 @@
           <a:p>
             <a:fld id="{48A87A34-81AB-432B-8DAE-1953F412C126}" type="datetimeFigureOut">
               <a:rPr lang="en-US" smtClean="0"/>
-              <a:t>9/20/2020</a:t>
+              <a:t>9/22/2020</a:t>
             </a:fld>
             <a:endParaRPr lang="en-US" dirty="0"/>
           </a:p>
@@ -2101,7 +2101,7 @@
           <a:p>
             <a:fld id="{48A87A34-81AB-432B-8DAE-1953F412C126}" type="datetimeFigureOut">
               <a:rPr lang="en-US" smtClean="0"/>
-              <a:t>9/20/2020</a:t>
+              <a:t>9/22/2020</a:t>
             </a:fld>
             <a:endParaRPr lang="en-US" dirty="0"/>
           </a:p>
@@ -2272,7 +2272,7 @@
           <a:p>
             <a:fld id="{48A87A34-81AB-432B-8DAE-1953F412C126}" type="datetimeFigureOut">
               <a:rPr lang="en-US" smtClean="0"/>
-              <a:t>9/20/2020</a:t>
+              <a:t>9/22/2020</a:t>
             </a:fld>
             <a:endParaRPr lang="en-US" dirty="0"/>
           </a:p>
@@ -2626,7 +2626,7 @@
           <a:p>
             <a:fld id="{48A87A34-81AB-432B-8DAE-1953F412C126}" type="datetimeFigureOut">
               <a:rPr lang="en-US" smtClean="0"/>
-              <a:t>9/20/2020</a:t>
+              <a:t>9/22/2020</a:t>
             </a:fld>
             <a:endParaRPr lang="en-US" dirty="0"/>
           </a:p>
@@ -3008,7 +3008,7 @@
           <a:p>
             <a:fld id="{48A87A34-81AB-432B-8DAE-1953F412C126}" type="datetimeFigureOut">
               <a:rPr lang="en-US" smtClean="0"/>
-              <a:t>9/20/2020</a:t>
+              <a:t>9/22/2020</a:t>
             </a:fld>
             <a:endParaRPr lang="en-US" dirty="0"/>
           </a:p>
@@ -3296,7 +3296,7 @@
             <a:fld id="{48A87A34-81AB-432B-8DAE-1953F412C126}" type="datetimeFigureOut">
               <a:rPr lang="en-US" smtClean="0"/>
               <a:pPr/>
-              <a:t>9/20/2020</a:t>
+              <a:t>9/22/2020</a:t>
             </a:fld>
             <a:endParaRPr lang="en-US" dirty="0"/>
           </a:p>
@@ -5158,7 +5158,15 @@
             </a:pPr>
             <a:r>
               <a:rPr lang="en-US" dirty="0"/>
-              <a:t>Use the “help” button to get my attention</a:t>
+              <a:t>Use the “help” button (</a:t>
+            </a:r>
+            <a:r>
+              <a:rPr lang="en-US"/>
+              <a:t>under more) to </a:t>
+            </a:r>
+            <a:r>
+              <a:rPr lang="en-US" dirty="0"/>
+              <a:t>get my attention</a:t>
             </a:r>
           </a:p>
           <a:p>
@@ -6385,6 +6393,20 @@
             <a:r>
               <a:rPr lang="en-US" sz="1500" dirty="0"/>
               <a:t>3 points for code that works correctly</a:t>
+            </a:r>
+          </a:p>
+          <a:p>
+            <a:pPr>
+              <a:buFont typeface="Wingdings" panose="05000000000000000000" pitchFamily="2" charset="2"/>
+              <a:buChar char="§"/>
+            </a:pPr>
+            <a:r>
+              <a:rPr lang="en-US" sz="1700" dirty="0"/>
+              <a:t> </a:t>
+            </a:r>
+            <a:r>
+              <a:rPr lang="en-US" sz="1500" dirty="0"/>
+              <a:t>labs make up 20% of your final grade</a:t>
             </a:r>
           </a:p>
           <a:p>

</xml_diff>